<commit_message>
update session 05 slides
</commit_message>
<xml_diff>
--- a/slides/Session 05 - Data Transformation.pptx
+++ b/slides/Session 05 - Data Transformation.pptx
@@ -8,13 +8,29 @@
     <p:notesMasterId r:id="rId5"/>
   </p:notesMasterIdLst>
   <p:handoutMasterIdLst>
-    <p:handoutMasterId r:id="rId8"/>
+    <p:handoutMasterId r:id="rId24"/>
   </p:handoutMasterIdLst>
   <p:sldIdLst>
     <p:sldId id="256" r:id="rId3"/>
-    <p:sldId id="276" r:id="rId4"/>
-    <p:sldId id="268" r:id="rId6"/>
-    <p:sldId id="270" r:id="rId7"/>
+    <p:sldId id="362" r:id="rId4"/>
+    <p:sldId id="374" r:id="rId6"/>
+    <p:sldId id="276" r:id="rId7"/>
+    <p:sldId id="363" r:id="rId8"/>
+    <p:sldId id="364" r:id="rId9"/>
+    <p:sldId id="365" r:id="rId10"/>
+    <p:sldId id="366" r:id="rId11"/>
+    <p:sldId id="367" r:id="rId12"/>
+    <p:sldId id="368" r:id="rId13"/>
+    <p:sldId id="369" r:id="rId14"/>
+    <p:sldId id="370" r:id="rId15"/>
+    <p:sldId id="375" r:id="rId16"/>
+    <p:sldId id="371" r:id="rId17"/>
+    <p:sldId id="376" r:id="rId18"/>
+    <p:sldId id="372" r:id="rId19"/>
+    <p:sldId id="377" r:id="rId20"/>
+    <p:sldId id="373" r:id="rId21"/>
+    <p:sldId id="268" r:id="rId22"/>
+    <p:sldId id="270" r:id="rId23"/>
   </p:sldIdLst>
   <p:sldSz cx="12192000" cy="6858000"/>
   <p:notesSz cx="7103745" cy="10234295"/>
@@ -628,6 +644,902 @@
 </file>
 
 <file path=ppt/notesSlides/notesSlide1.xml><?xml version="1.0" encoding="utf-8"?>
+<p:notes xmlns:a="http://schemas.openxmlformats.org/drawingml/2006/main" xmlns:r="http://schemas.openxmlformats.org/officeDocument/2006/relationships" xmlns:p="http://schemas.openxmlformats.org/presentationml/2006/main">
+  <p:cSld>
+    <p:spTree>
+      <p:nvGrpSpPr>
+        <p:cNvPr id="1" name=""/>
+        <p:cNvGrpSpPr/>
+        <p:nvPr/>
+      </p:nvGrpSpPr>
+      <p:grpSpPr>
+        <a:xfrm>
+          <a:off x="0" y="0"/>
+          <a:ext cx="0" cy="0"/>
+          <a:chOff x="0" y="0"/>
+          <a:chExt cx="0" cy="0"/>
+        </a:xfrm>
+      </p:grpSpPr>
+      <p:sp>
+        <p:nvSpPr>
+          <p:cNvPr id="2" name="Slide Image Placeholder 1"/>
+          <p:cNvSpPr>
+            <a:spLocks noGrp="1" noRot="1" noChangeAspect="1"/>
+          </p:cNvSpPr>
+          <p:nvPr>
+            <p:ph type="sldImg" idx="2"/>
+          </p:nvPr>
+        </p:nvSpPr>
+        <p:spPr/>
+      </p:sp>
+      <p:sp>
+        <p:nvSpPr>
+          <p:cNvPr id="3" name="Text Placeholder 2"/>
+          <p:cNvSpPr>
+            <a:spLocks noGrp="1"/>
+          </p:cNvSpPr>
+          <p:nvPr>
+            <p:ph type="body" idx="3"/>
+          </p:nvPr>
+        </p:nvSpPr>
+        <p:spPr/>
+        <p:txBody>
+          <a:bodyPr/>
+          <a:lstStyle/>
+          <a:p>
+            <a:endParaRPr lang="en-US" dirty="0"/>
+          </a:p>
+        </p:txBody>
+      </p:sp>
+    </p:spTree>
+  </p:cSld>
+  <p:clrMapOvr>
+    <a:masterClrMapping/>
+  </p:clrMapOvr>
+</p:notes>
+</file>
+
+<file path=ppt/notesSlides/notesSlide10.xml><?xml version="1.0" encoding="utf-8"?>
+<p:notes xmlns:a="http://schemas.openxmlformats.org/drawingml/2006/main" xmlns:r="http://schemas.openxmlformats.org/officeDocument/2006/relationships" xmlns:p="http://schemas.openxmlformats.org/presentationml/2006/main">
+  <p:cSld>
+    <p:spTree>
+      <p:nvGrpSpPr>
+        <p:cNvPr id="1" name=""/>
+        <p:cNvGrpSpPr/>
+        <p:nvPr/>
+      </p:nvGrpSpPr>
+      <p:grpSpPr>
+        <a:xfrm>
+          <a:off x="0" y="0"/>
+          <a:ext cx="0" cy="0"/>
+          <a:chOff x="0" y="0"/>
+          <a:chExt cx="0" cy="0"/>
+        </a:xfrm>
+      </p:grpSpPr>
+      <p:sp>
+        <p:nvSpPr>
+          <p:cNvPr id="2" name="Slide Image Placeholder 1"/>
+          <p:cNvSpPr>
+            <a:spLocks noGrp="1" noRot="1" noChangeAspect="1"/>
+          </p:cNvSpPr>
+          <p:nvPr>
+            <p:ph type="sldImg" idx="2"/>
+          </p:nvPr>
+        </p:nvSpPr>
+        <p:spPr/>
+      </p:sp>
+      <p:sp>
+        <p:nvSpPr>
+          <p:cNvPr id="3" name="Text Placeholder 2"/>
+          <p:cNvSpPr>
+            <a:spLocks noGrp="1"/>
+          </p:cNvSpPr>
+          <p:nvPr>
+            <p:ph type="body" idx="3"/>
+          </p:nvPr>
+        </p:nvSpPr>
+        <p:spPr/>
+        <p:txBody>
+          <a:bodyPr/>
+          <a:lstStyle/>
+          <a:p>
+            <a:endParaRPr lang="en-US" dirty="0"/>
+          </a:p>
+        </p:txBody>
+      </p:sp>
+    </p:spTree>
+  </p:cSld>
+  <p:clrMapOvr>
+    <a:masterClrMapping/>
+  </p:clrMapOvr>
+</p:notes>
+</file>
+
+<file path=ppt/notesSlides/notesSlide11.xml><?xml version="1.0" encoding="utf-8"?>
+<p:notes xmlns:a="http://schemas.openxmlformats.org/drawingml/2006/main" xmlns:r="http://schemas.openxmlformats.org/officeDocument/2006/relationships" xmlns:p="http://schemas.openxmlformats.org/presentationml/2006/main">
+  <p:cSld>
+    <p:spTree>
+      <p:nvGrpSpPr>
+        <p:cNvPr id="1" name=""/>
+        <p:cNvGrpSpPr/>
+        <p:nvPr/>
+      </p:nvGrpSpPr>
+      <p:grpSpPr>
+        <a:xfrm>
+          <a:off x="0" y="0"/>
+          <a:ext cx="0" cy="0"/>
+          <a:chOff x="0" y="0"/>
+          <a:chExt cx="0" cy="0"/>
+        </a:xfrm>
+      </p:grpSpPr>
+      <p:sp>
+        <p:nvSpPr>
+          <p:cNvPr id="2" name="Slide Image Placeholder 1"/>
+          <p:cNvSpPr>
+            <a:spLocks noGrp="1" noRot="1" noChangeAspect="1"/>
+          </p:cNvSpPr>
+          <p:nvPr>
+            <p:ph type="sldImg" idx="2"/>
+          </p:nvPr>
+        </p:nvSpPr>
+        <p:spPr/>
+      </p:sp>
+      <p:sp>
+        <p:nvSpPr>
+          <p:cNvPr id="3" name="Text Placeholder 2"/>
+          <p:cNvSpPr>
+            <a:spLocks noGrp="1"/>
+          </p:cNvSpPr>
+          <p:nvPr>
+            <p:ph type="body" idx="3"/>
+          </p:nvPr>
+        </p:nvSpPr>
+        <p:spPr/>
+        <p:txBody>
+          <a:bodyPr/>
+          <a:lstStyle/>
+          <a:p>
+            <a:endParaRPr lang="en-US" dirty="0"/>
+          </a:p>
+        </p:txBody>
+      </p:sp>
+    </p:spTree>
+  </p:cSld>
+  <p:clrMapOvr>
+    <a:masterClrMapping/>
+  </p:clrMapOvr>
+</p:notes>
+</file>
+
+<file path=ppt/notesSlides/notesSlide12.xml><?xml version="1.0" encoding="utf-8"?>
+<p:notes xmlns:a="http://schemas.openxmlformats.org/drawingml/2006/main" xmlns:r="http://schemas.openxmlformats.org/officeDocument/2006/relationships" xmlns:p="http://schemas.openxmlformats.org/presentationml/2006/main">
+  <p:cSld>
+    <p:spTree>
+      <p:nvGrpSpPr>
+        <p:cNvPr id="1" name=""/>
+        <p:cNvGrpSpPr/>
+        <p:nvPr/>
+      </p:nvGrpSpPr>
+      <p:grpSpPr>
+        <a:xfrm>
+          <a:off x="0" y="0"/>
+          <a:ext cx="0" cy="0"/>
+          <a:chOff x="0" y="0"/>
+          <a:chExt cx="0" cy="0"/>
+        </a:xfrm>
+      </p:grpSpPr>
+      <p:sp>
+        <p:nvSpPr>
+          <p:cNvPr id="2" name="Slide Image Placeholder 1"/>
+          <p:cNvSpPr>
+            <a:spLocks noGrp="1" noRot="1" noChangeAspect="1"/>
+          </p:cNvSpPr>
+          <p:nvPr>
+            <p:ph type="sldImg" idx="2"/>
+          </p:nvPr>
+        </p:nvSpPr>
+        <p:spPr/>
+      </p:sp>
+      <p:sp>
+        <p:nvSpPr>
+          <p:cNvPr id="3" name="Text Placeholder 2"/>
+          <p:cNvSpPr>
+            <a:spLocks noGrp="1"/>
+          </p:cNvSpPr>
+          <p:nvPr>
+            <p:ph type="body" idx="3"/>
+          </p:nvPr>
+        </p:nvSpPr>
+        <p:spPr/>
+        <p:txBody>
+          <a:bodyPr/>
+          <a:lstStyle/>
+          <a:p>
+            <a:endParaRPr lang="en-US" dirty="0"/>
+          </a:p>
+        </p:txBody>
+      </p:sp>
+    </p:spTree>
+  </p:cSld>
+  <p:clrMapOvr>
+    <a:masterClrMapping/>
+  </p:clrMapOvr>
+</p:notes>
+</file>
+
+<file path=ppt/notesSlides/notesSlide13.xml><?xml version="1.0" encoding="utf-8"?>
+<p:notes xmlns:a="http://schemas.openxmlformats.org/drawingml/2006/main" xmlns:r="http://schemas.openxmlformats.org/officeDocument/2006/relationships" xmlns:p="http://schemas.openxmlformats.org/presentationml/2006/main">
+  <p:cSld>
+    <p:spTree>
+      <p:nvGrpSpPr>
+        <p:cNvPr id="1" name=""/>
+        <p:cNvGrpSpPr/>
+        <p:nvPr/>
+      </p:nvGrpSpPr>
+      <p:grpSpPr>
+        <a:xfrm>
+          <a:off x="0" y="0"/>
+          <a:ext cx="0" cy="0"/>
+          <a:chOff x="0" y="0"/>
+          <a:chExt cx="0" cy="0"/>
+        </a:xfrm>
+      </p:grpSpPr>
+      <p:sp>
+        <p:nvSpPr>
+          <p:cNvPr id="2" name="Slide Image Placeholder 1"/>
+          <p:cNvSpPr>
+            <a:spLocks noGrp="1" noRot="1" noChangeAspect="1"/>
+          </p:cNvSpPr>
+          <p:nvPr>
+            <p:ph type="sldImg" idx="2"/>
+          </p:nvPr>
+        </p:nvSpPr>
+        <p:spPr/>
+      </p:sp>
+      <p:sp>
+        <p:nvSpPr>
+          <p:cNvPr id="3" name="Text Placeholder 2"/>
+          <p:cNvSpPr>
+            <a:spLocks noGrp="1"/>
+          </p:cNvSpPr>
+          <p:nvPr>
+            <p:ph type="body" idx="3"/>
+          </p:nvPr>
+        </p:nvSpPr>
+        <p:spPr/>
+        <p:txBody>
+          <a:bodyPr/>
+          <a:lstStyle/>
+          <a:p>
+            <a:endParaRPr lang="en-US" dirty="0"/>
+          </a:p>
+        </p:txBody>
+      </p:sp>
+    </p:spTree>
+  </p:cSld>
+  <p:clrMapOvr>
+    <a:masterClrMapping/>
+  </p:clrMapOvr>
+</p:notes>
+</file>
+
+<file path=ppt/notesSlides/notesSlide14.xml><?xml version="1.0" encoding="utf-8"?>
+<p:notes xmlns:a="http://schemas.openxmlformats.org/drawingml/2006/main" xmlns:r="http://schemas.openxmlformats.org/officeDocument/2006/relationships" xmlns:p="http://schemas.openxmlformats.org/presentationml/2006/main">
+  <p:cSld>
+    <p:spTree>
+      <p:nvGrpSpPr>
+        <p:cNvPr id="1" name=""/>
+        <p:cNvGrpSpPr/>
+        <p:nvPr/>
+      </p:nvGrpSpPr>
+      <p:grpSpPr>
+        <a:xfrm>
+          <a:off x="0" y="0"/>
+          <a:ext cx="0" cy="0"/>
+          <a:chOff x="0" y="0"/>
+          <a:chExt cx="0" cy="0"/>
+        </a:xfrm>
+      </p:grpSpPr>
+      <p:sp>
+        <p:nvSpPr>
+          <p:cNvPr id="2" name="Slide Image Placeholder 1"/>
+          <p:cNvSpPr>
+            <a:spLocks noGrp="1" noRot="1" noChangeAspect="1"/>
+          </p:cNvSpPr>
+          <p:nvPr>
+            <p:ph type="sldImg" idx="2"/>
+          </p:nvPr>
+        </p:nvSpPr>
+        <p:spPr/>
+      </p:sp>
+      <p:sp>
+        <p:nvSpPr>
+          <p:cNvPr id="3" name="Text Placeholder 2"/>
+          <p:cNvSpPr>
+            <a:spLocks noGrp="1"/>
+          </p:cNvSpPr>
+          <p:nvPr>
+            <p:ph type="body" idx="3"/>
+          </p:nvPr>
+        </p:nvSpPr>
+        <p:spPr/>
+        <p:txBody>
+          <a:bodyPr/>
+          <a:lstStyle/>
+          <a:p>
+            <a:endParaRPr lang="en-US" dirty="0"/>
+          </a:p>
+        </p:txBody>
+      </p:sp>
+    </p:spTree>
+  </p:cSld>
+  <p:clrMapOvr>
+    <a:masterClrMapping/>
+  </p:clrMapOvr>
+</p:notes>
+</file>
+
+<file path=ppt/notesSlides/notesSlide15.xml><?xml version="1.0" encoding="utf-8"?>
+<p:notes xmlns:a="http://schemas.openxmlformats.org/drawingml/2006/main" xmlns:r="http://schemas.openxmlformats.org/officeDocument/2006/relationships" xmlns:p="http://schemas.openxmlformats.org/presentationml/2006/main">
+  <p:cSld>
+    <p:spTree>
+      <p:nvGrpSpPr>
+        <p:cNvPr id="1" name=""/>
+        <p:cNvGrpSpPr/>
+        <p:nvPr/>
+      </p:nvGrpSpPr>
+      <p:grpSpPr>
+        <a:xfrm>
+          <a:off x="0" y="0"/>
+          <a:ext cx="0" cy="0"/>
+          <a:chOff x="0" y="0"/>
+          <a:chExt cx="0" cy="0"/>
+        </a:xfrm>
+      </p:grpSpPr>
+      <p:sp>
+        <p:nvSpPr>
+          <p:cNvPr id="2" name="Slide Image Placeholder 1"/>
+          <p:cNvSpPr>
+            <a:spLocks noGrp="1" noRot="1" noChangeAspect="1"/>
+          </p:cNvSpPr>
+          <p:nvPr>
+            <p:ph type="sldImg" idx="2"/>
+          </p:nvPr>
+        </p:nvSpPr>
+        <p:spPr/>
+      </p:sp>
+      <p:sp>
+        <p:nvSpPr>
+          <p:cNvPr id="3" name="Text Placeholder 2"/>
+          <p:cNvSpPr>
+            <a:spLocks noGrp="1"/>
+          </p:cNvSpPr>
+          <p:nvPr>
+            <p:ph type="body" idx="3"/>
+          </p:nvPr>
+        </p:nvSpPr>
+        <p:spPr/>
+        <p:txBody>
+          <a:bodyPr/>
+          <a:lstStyle/>
+          <a:p>
+            <a:endParaRPr lang="en-US" dirty="0"/>
+          </a:p>
+        </p:txBody>
+      </p:sp>
+    </p:spTree>
+  </p:cSld>
+  <p:clrMapOvr>
+    <a:masterClrMapping/>
+  </p:clrMapOvr>
+</p:notes>
+</file>
+
+<file path=ppt/notesSlides/notesSlide16.xml><?xml version="1.0" encoding="utf-8"?>
+<p:notes xmlns:a="http://schemas.openxmlformats.org/drawingml/2006/main" xmlns:r="http://schemas.openxmlformats.org/officeDocument/2006/relationships" xmlns:p="http://schemas.openxmlformats.org/presentationml/2006/main">
+  <p:cSld>
+    <p:spTree>
+      <p:nvGrpSpPr>
+        <p:cNvPr id="1" name=""/>
+        <p:cNvGrpSpPr/>
+        <p:nvPr/>
+      </p:nvGrpSpPr>
+      <p:grpSpPr>
+        <a:xfrm>
+          <a:off x="0" y="0"/>
+          <a:ext cx="0" cy="0"/>
+          <a:chOff x="0" y="0"/>
+          <a:chExt cx="0" cy="0"/>
+        </a:xfrm>
+      </p:grpSpPr>
+      <p:sp>
+        <p:nvSpPr>
+          <p:cNvPr id="2" name="Slide Image Placeholder 1"/>
+          <p:cNvSpPr>
+            <a:spLocks noGrp="1" noRot="1" noChangeAspect="1"/>
+          </p:cNvSpPr>
+          <p:nvPr>
+            <p:ph type="sldImg" idx="2"/>
+          </p:nvPr>
+        </p:nvSpPr>
+        <p:spPr/>
+      </p:sp>
+      <p:sp>
+        <p:nvSpPr>
+          <p:cNvPr id="3" name="Text Placeholder 2"/>
+          <p:cNvSpPr>
+            <a:spLocks noGrp="1"/>
+          </p:cNvSpPr>
+          <p:nvPr>
+            <p:ph type="body" idx="3"/>
+          </p:nvPr>
+        </p:nvSpPr>
+        <p:spPr/>
+        <p:txBody>
+          <a:bodyPr/>
+          <a:lstStyle/>
+          <a:p>
+            <a:endParaRPr lang="en-US" dirty="0"/>
+          </a:p>
+        </p:txBody>
+      </p:sp>
+    </p:spTree>
+  </p:cSld>
+  <p:clrMapOvr>
+    <a:masterClrMapping/>
+  </p:clrMapOvr>
+</p:notes>
+</file>
+
+<file path=ppt/notesSlides/notesSlide17.xml><?xml version="1.0" encoding="utf-8"?>
+<p:notes xmlns:a="http://schemas.openxmlformats.org/drawingml/2006/main" xmlns:r="http://schemas.openxmlformats.org/officeDocument/2006/relationships" xmlns:p="http://schemas.openxmlformats.org/presentationml/2006/main">
+  <p:cSld>
+    <p:spTree>
+      <p:nvGrpSpPr>
+        <p:cNvPr id="1" name=""/>
+        <p:cNvGrpSpPr/>
+        <p:nvPr/>
+      </p:nvGrpSpPr>
+      <p:grpSpPr>
+        <a:xfrm>
+          <a:off x="0" y="0"/>
+          <a:ext cx="0" cy="0"/>
+          <a:chOff x="0" y="0"/>
+          <a:chExt cx="0" cy="0"/>
+        </a:xfrm>
+      </p:grpSpPr>
+      <p:sp>
+        <p:nvSpPr>
+          <p:cNvPr id="2" name="Slide Image Placeholder 1"/>
+          <p:cNvSpPr>
+            <a:spLocks noGrp="1" noRot="1" noChangeAspect="1"/>
+          </p:cNvSpPr>
+          <p:nvPr>
+            <p:ph type="sldImg" idx="2"/>
+          </p:nvPr>
+        </p:nvSpPr>
+        <p:spPr/>
+      </p:sp>
+      <p:sp>
+        <p:nvSpPr>
+          <p:cNvPr id="3" name="Text Placeholder 2"/>
+          <p:cNvSpPr>
+            <a:spLocks noGrp="1"/>
+          </p:cNvSpPr>
+          <p:nvPr>
+            <p:ph type="body" idx="3"/>
+          </p:nvPr>
+        </p:nvSpPr>
+        <p:spPr/>
+        <p:txBody>
+          <a:bodyPr/>
+          <a:lstStyle/>
+          <a:p>
+            <a:endParaRPr lang="en-US" dirty="0"/>
+          </a:p>
+        </p:txBody>
+      </p:sp>
+    </p:spTree>
+  </p:cSld>
+  <p:clrMapOvr>
+    <a:masterClrMapping/>
+  </p:clrMapOvr>
+</p:notes>
+</file>
+
+<file path=ppt/notesSlides/notesSlide2.xml><?xml version="1.0" encoding="utf-8"?>
+<p:notes xmlns:a="http://schemas.openxmlformats.org/drawingml/2006/main" xmlns:r="http://schemas.openxmlformats.org/officeDocument/2006/relationships" xmlns:p="http://schemas.openxmlformats.org/presentationml/2006/main">
+  <p:cSld>
+    <p:spTree>
+      <p:nvGrpSpPr>
+        <p:cNvPr id="1" name=""/>
+        <p:cNvGrpSpPr/>
+        <p:nvPr/>
+      </p:nvGrpSpPr>
+      <p:grpSpPr>
+        <a:xfrm>
+          <a:off x="0" y="0"/>
+          <a:ext cx="0" cy="0"/>
+          <a:chOff x="0" y="0"/>
+          <a:chExt cx="0" cy="0"/>
+        </a:xfrm>
+      </p:grpSpPr>
+      <p:sp>
+        <p:nvSpPr>
+          <p:cNvPr id="2" name="Slide Image Placeholder 1"/>
+          <p:cNvSpPr>
+            <a:spLocks noGrp="1" noRot="1" noChangeAspect="1"/>
+          </p:cNvSpPr>
+          <p:nvPr>
+            <p:ph type="sldImg" idx="2"/>
+          </p:nvPr>
+        </p:nvSpPr>
+        <p:spPr/>
+      </p:sp>
+      <p:sp>
+        <p:nvSpPr>
+          <p:cNvPr id="3" name="Text Placeholder 2"/>
+          <p:cNvSpPr>
+            <a:spLocks noGrp="1"/>
+          </p:cNvSpPr>
+          <p:nvPr>
+            <p:ph type="body" idx="3"/>
+          </p:nvPr>
+        </p:nvSpPr>
+        <p:spPr/>
+        <p:txBody>
+          <a:bodyPr/>
+          <a:lstStyle/>
+          <a:p>
+            <a:endParaRPr lang="en-US" dirty="0"/>
+          </a:p>
+        </p:txBody>
+      </p:sp>
+    </p:spTree>
+  </p:cSld>
+  <p:clrMapOvr>
+    <a:masterClrMapping/>
+  </p:clrMapOvr>
+</p:notes>
+</file>
+
+<file path=ppt/notesSlides/notesSlide3.xml><?xml version="1.0" encoding="utf-8"?>
+<p:notes xmlns:a="http://schemas.openxmlformats.org/drawingml/2006/main" xmlns:r="http://schemas.openxmlformats.org/officeDocument/2006/relationships" xmlns:p="http://schemas.openxmlformats.org/presentationml/2006/main">
+  <p:cSld>
+    <p:spTree>
+      <p:nvGrpSpPr>
+        <p:cNvPr id="1" name=""/>
+        <p:cNvGrpSpPr/>
+        <p:nvPr/>
+      </p:nvGrpSpPr>
+      <p:grpSpPr>
+        <a:xfrm>
+          <a:off x="0" y="0"/>
+          <a:ext cx="0" cy="0"/>
+          <a:chOff x="0" y="0"/>
+          <a:chExt cx="0" cy="0"/>
+        </a:xfrm>
+      </p:grpSpPr>
+      <p:sp>
+        <p:nvSpPr>
+          <p:cNvPr id="2" name="Slide Image Placeholder 1"/>
+          <p:cNvSpPr>
+            <a:spLocks noGrp="1" noRot="1" noChangeAspect="1"/>
+          </p:cNvSpPr>
+          <p:nvPr>
+            <p:ph type="sldImg" idx="2"/>
+          </p:nvPr>
+        </p:nvSpPr>
+        <p:spPr/>
+      </p:sp>
+      <p:sp>
+        <p:nvSpPr>
+          <p:cNvPr id="3" name="Text Placeholder 2"/>
+          <p:cNvSpPr>
+            <a:spLocks noGrp="1"/>
+          </p:cNvSpPr>
+          <p:nvPr>
+            <p:ph type="body" idx="3"/>
+          </p:nvPr>
+        </p:nvSpPr>
+        <p:spPr/>
+        <p:txBody>
+          <a:bodyPr/>
+          <a:lstStyle/>
+          <a:p>
+            <a:endParaRPr lang="en-US" dirty="0"/>
+          </a:p>
+        </p:txBody>
+      </p:sp>
+    </p:spTree>
+  </p:cSld>
+  <p:clrMapOvr>
+    <a:masterClrMapping/>
+  </p:clrMapOvr>
+</p:notes>
+</file>
+
+<file path=ppt/notesSlides/notesSlide4.xml><?xml version="1.0" encoding="utf-8"?>
+<p:notes xmlns:a="http://schemas.openxmlformats.org/drawingml/2006/main" xmlns:r="http://schemas.openxmlformats.org/officeDocument/2006/relationships" xmlns:p="http://schemas.openxmlformats.org/presentationml/2006/main">
+  <p:cSld>
+    <p:spTree>
+      <p:nvGrpSpPr>
+        <p:cNvPr id="1" name=""/>
+        <p:cNvGrpSpPr/>
+        <p:nvPr/>
+      </p:nvGrpSpPr>
+      <p:grpSpPr>
+        <a:xfrm>
+          <a:off x="0" y="0"/>
+          <a:ext cx="0" cy="0"/>
+          <a:chOff x="0" y="0"/>
+          <a:chExt cx="0" cy="0"/>
+        </a:xfrm>
+      </p:grpSpPr>
+      <p:sp>
+        <p:nvSpPr>
+          <p:cNvPr id="2" name="Slide Image Placeholder 1"/>
+          <p:cNvSpPr>
+            <a:spLocks noGrp="1" noRot="1" noChangeAspect="1"/>
+          </p:cNvSpPr>
+          <p:nvPr>
+            <p:ph type="sldImg" idx="2"/>
+          </p:nvPr>
+        </p:nvSpPr>
+        <p:spPr/>
+      </p:sp>
+      <p:sp>
+        <p:nvSpPr>
+          <p:cNvPr id="3" name="Text Placeholder 2"/>
+          <p:cNvSpPr>
+            <a:spLocks noGrp="1"/>
+          </p:cNvSpPr>
+          <p:nvPr>
+            <p:ph type="body" idx="3"/>
+          </p:nvPr>
+        </p:nvSpPr>
+        <p:spPr/>
+        <p:txBody>
+          <a:bodyPr/>
+          <a:lstStyle/>
+          <a:p>
+            <a:endParaRPr lang="en-US" dirty="0"/>
+          </a:p>
+        </p:txBody>
+      </p:sp>
+    </p:spTree>
+  </p:cSld>
+  <p:clrMapOvr>
+    <a:masterClrMapping/>
+  </p:clrMapOvr>
+</p:notes>
+</file>
+
+<file path=ppt/notesSlides/notesSlide5.xml><?xml version="1.0" encoding="utf-8"?>
+<p:notes xmlns:a="http://schemas.openxmlformats.org/drawingml/2006/main" xmlns:r="http://schemas.openxmlformats.org/officeDocument/2006/relationships" xmlns:p="http://schemas.openxmlformats.org/presentationml/2006/main">
+  <p:cSld>
+    <p:spTree>
+      <p:nvGrpSpPr>
+        <p:cNvPr id="1" name=""/>
+        <p:cNvGrpSpPr/>
+        <p:nvPr/>
+      </p:nvGrpSpPr>
+      <p:grpSpPr>
+        <a:xfrm>
+          <a:off x="0" y="0"/>
+          <a:ext cx="0" cy="0"/>
+          <a:chOff x="0" y="0"/>
+          <a:chExt cx="0" cy="0"/>
+        </a:xfrm>
+      </p:grpSpPr>
+      <p:sp>
+        <p:nvSpPr>
+          <p:cNvPr id="2" name="Slide Image Placeholder 1"/>
+          <p:cNvSpPr>
+            <a:spLocks noGrp="1" noRot="1" noChangeAspect="1"/>
+          </p:cNvSpPr>
+          <p:nvPr>
+            <p:ph type="sldImg" idx="2"/>
+          </p:nvPr>
+        </p:nvSpPr>
+        <p:spPr/>
+      </p:sp>
+      <p:sp>
+        <p:nvSpPr>
+          <p:cNvPr id="3" name="Text Placeholder 2"/>
+          <p:cNvSpPr>
+            <a:spLocks noGrp="1"/>
+          </p:cNvSpPr>
+          <p:nvPr>
+            <p:ph type="body" idx="3"/>
+          </p:nvPr>
+        </p:nvSpPr>
+        <p:spPr/>
+        <p:txBody>
+          <a:bodyPr/>
+          <a:lstStyle/>
+          <a:p>
+            <a:endParaRPr lang="en-US" dirty="0"/>
+          </a:p>
+        </p:txBody>
+      </p:sp>
+    </p:spTree>
+  </p:cSld>
+  <p:clrMapOvr>
+    <a:masterClrMapping/>
+  </p:clrMapOvr>
+</p:notes>
+</file>
+
+<file path=ppt/notesSlides/notesSlide6.xml><?xml version="1.0" encoding="utf-8"?>
+<p:notes xmlns:a="http://schemas.openxmlformats.org/drawingml/2006/main" xmlns:r="http://schemas.openxmlformats.org/officeDocument/2006/relationships" xmlns:p="http://schemas.openxmlformats.org/presentationml/2006/main">
+  <p:cSld>
+    <p:spTree>
+      <p:nvGrpSpPr>
+        <p:cNvPr id="1" name=""/>
+        <p:cNvGrpSpPr/>
+        <p:nvPr/>
+      </p:nvGrpSpPr>
+      <p:grpSpPr>
+        <a:xfrm>
+          <a:off x="0" y="0"/>
+          <a:ext cx="0" cy="0"/>
+          <a:chOff x="0" y="0"/>
+          <a:chExt cx="0" cy="0"/>
+        </a:xfrm>
+      </p:grpSpPr>
+      <p:sp>
+        <p:nvSpPr>
+          <p:cNvPr id="2" name="Slide Image Placeholder 1"/>
+          <p:cNvSpPr>
+            <a:spLocks noGrp="1" noRot="1" noChangeAspect="1"/>
+          </p:cNvSpPr>
+          <p:nvPr>
+            <p:ph type="sldImg" idx="2"/>
+          </p:nvPr>
+        </p:nvSpPr>
+        <p:spPr/>
+      </p:sp>
+      <p:sp>
+        <p:nvSpPr>
+          <p:cNvPr id="3" name="Text Placeholder 2"/>
+          <p:cNvSpPr>
+            <a:spLocks noGrp="1"/>
+          </p:cNvSpPr>
+          <p:nvPr>
+            <p:ph type="body" idx="3"/>
+          </p:nvPr>
+        </p:nvSpPr>
+        <p:spPr/>
+        <p:txBody>
+          <a:bodyPr/>
+          <a:lstStyle/>
+          <a:p>
+            <a:endParaRPr lang="en-US" dirty="0"/>
+          </a:p>
+        </p:txBody>
+      </p:sp>
+    </p:spTree>
+  </p:cSld>
+  <p:clrMapOvr>
+    <a:masterClrMapping/>
+  </p:clrMapOvr>
+</p:notes>
+</file>
+
+<file path=ppt/notesSlides/notesSlide7.xml><?xml version="1.0" encoding="utf-8"?>
+<p:notes xmlns:a="http://schemas.openxmlformats.org/drawingml/2006/main" xmlns:r="http://schemas.openxmlformats.org/officeDocument/2006/relationships" xmlns:p="http://schemas.openxmlformats.org/presentationml/2006/main">
+  <p:cSld>
+    <p:spTree>
+      <p:nvGrpSpPr>
+        <p:cNvPr id="1" name=""/>
+        <p:cNvGrpSpPr/>
+        <p:nvPr/>
+      </p:nvGrpSpPr>
+      <p:grpSpPr>
+        <a:xfrm>
+          <a:off x="0" y="0"/>
+          <a:ext cx="0" cy="0"/>
+          <a:chOff x="0" y="0"/>
+          <a:chExt cx="0" cy="0"/>
+        </a:xfrm>
+      </p:grpSpPr>
+      <p:sp>
+        <p:nvSpPr>
+          <p:cNvPr id="2" name="Slide Image Placeholder 1"/>
+          <p:cNvSpPr>
+            <a:spLocks noGrp="1" noRot="1" noChangeAspect="1"/>
+          </p:cNvSpPr>
+          <p:nvPr>
+            <p:ph type="sldImg" idx="2"/>
+          </p:nvPr>
+        </p:nvSpPr>
+        <p:spPr/>
+      </p:sp>
+      <p:sp>
+        <p:nvSpPr>
+          <p:cNvPr id="3" name="Text Placeholder 2"/>
+          <p:cNvSpPr>
+            <a:spLocks noGrp="1"/>
+          </p:cNvSpPr>
+          <p:nvPr>
+            <p:ph type="body" idx="3"/>
+          </p:nvPr>
+        </p:nvSpPr>
+        <p:spPr/>
+        <p:txBody>
+          <a:bodyPr/>
+          <a:lstStyle/>
+          <a:p>
+            <a:endParaRPr lang="en-US" dirty="0"/>
+          </a:p>
+        </p:txBody>
+      </p:sp>
+    </p:spTree>
+  </p:cSld>
+  <p:clrMapOvr>
+    <a:masterClrMapping/>
+  </p:clrMapOvr>
+</p:notes>
+</file>
+
+<file path=ppt/notesSlides/notesSlide8.xml><?xml version="1.0" encoding="utf-8"?>
+<p:notes xmlns:a="http://schemas.openxmlformats.org/drawingml/2006/main" xmlns:r="http://schemas.openxmlformats.org/officeDocument/2006/relationships" xmlns:p="http://schemas.openxmlformats.org/presentationml/2006/main">
+  <p:cSld>
+    <p:spTree>
+      <p:nvGrpSpPr>
+        <p:cNvPr id="1" name=""/>
+        <p:cNvGrpSpPr/>
+        <p:nvPr/>
+      </p:nvGrpSpPr>
+      <p:grpSpPr>
+        <a:xfrm>
+          <a:off x="0" y="0"/>
+          <a:ext cx="0" cy="0"/>
+          <a:chOff x="0" y="0"/>
+          <a:chExt cx="0" cy="0"/>
+        </a:xfrm>
+      </p:grpSpPr>
+      <p:sp>
+        <p:nvSpPr>
+          <p:cNvPr id="2" name="Slide Image Placeholder 1"/>
+          <p:cNvSpPr>
+            <a:spLocks noGrp="1" noRot="1" noChangeAspect="1"/>
+          </p:cNvSpPr>
+          <p:nvPr>
+            <p:ph type="sldImg" idx="2"/>
+          </p:nvPr>
+        </p:nvSpPr>
+        <p:spPr/>
+      </p:sp>
+      <p:sp>
+        <p:nvSpPr>
+          <p:cNvPr id="3" name="Text Placeholder 2"/>
+          <p:cNvSpPr>
+            <a:spLocks noGrp="1"/>
+          </p:cNvSpPr>
+          <p:nvPr>
+            <p:ph type="body" idx="3"/>
+          </p:nvPr>
+        </p:nvSpPr>
+        <p:spPr/>
+        <p:txBody>
+          <a:bodyPr/>
+          <a:lstStyle/>
+          <a:p>
+            <a:endParaRPr lang="en-US" dirty="0"/>
+          </a:p>
+        </p:txBody>
+      </p:sp>
+    </p:spTree>
+  </p:cSld>
+  <p:clrMapOvr>
+    <a:masterClrMapping/>
+  </p:clrMapOvr>
+</p:notes>
+</file>
+
+<file path=ppt/notesSlides/notesSlide9.xml><?xml version="1.0" encoding="utf-8"?>
 <p:notes xmlns:a="http://schemas.openxmlformats.org/drawingml/2006/main" xmlns:r="http://schemas.openxmlformats.org/officeDocument/2006/relationships" xmlns:p="http://schemas.openxmlformats.org/presentationml/2006/main">
   <p:cSld>
     <p:spTree>
@@ -4163,6 +5075,1570 @@
 </p:sld>
 </file>
 
+<file path=ppt/slides/slide10.xml><?xml version="1.0" encoding="utf-8"?>
+<p:sld xmlns:a="http://schemas.openxmlformats.org/drawingml/2006/main" xmlns:r="http://schemas.openxmlformats.org/officeDocument/2006/relationships" xmlns:p="http://schemas.openxmlformats.org/presentationml/2006/main">
+  <p:cSld>
+    <p:spTree>
+      <p:nvGrpSpPr>
+        <p:cNvPr id="1" name=""/>
+        <p:cNvGrpSpPr/>
+        <p:nvPr/>
+      </p:nvGrpSpPr>
+      <p:grpSpPr>
+        <a:xfrm>
+          <a:off x="0" y="0"/>
+          <a:ext cx="0" cy="0"/>
+          <a:chOff x="0" y="0"/>
+          <a:chExt cx="0" cy="0"/>
+        </a:xfrm>
+      </p:grpSpPr>
+      <p:sp>
+        <p:nvSpPr>
+          <p:cNvPr id="2" name="Title 1"/>
+          <p:cNvSpPr>
+            <a:spLocks noGrp="1"/>
+          </p:cNvSpPr>
+          <p:nvPr>
+            <p:ph type="title"/>
+          </p:nvPr>
+        </p:nvSpPr>
+        <p:spPr/>
+        <p:txBody>
+          <a:bodyPr/>
+          <a:lstStyle/>
+          <a:p>
+            <a:pPr algn="l"/>
+            <a:r>
+              <a:rPr lang="en-US">
+                <a:latin typeface="Ubuntu" panose="020B0504030602030204" charset="0"/>
+                <a:cs typeface="Ubuntu" panose="020B0504030602030204" charset="0"/>
+              </a:rPr>
+              <a:t>Handle Columns Distribution (cont)</a:t>
+            </a:r>
+            <a:endParaRPr lang="en-US">
+              <a:latin typeface="Ubuntu" panose="020B0504030602030204" charset="0"/>
+              <a:cs typeface="Ubuntu" panose="020B0504030602030204" charset="0"/>
+            </a:endParaRPr>
+          </a:p>
+        </p:txBody>
+      </p:sp>
+      <p:sp>
+        <p:nvSpPr>
+          <p:cNvPr id="3" name="Content Placeholder 2"/>
+          <p:cNvSpPr>
+            <a:spLocks noGrp="1"/>
+          </p:cNvSpPr>
+          <p:nvPr>
+            <p:ph idx="1"/>
+          </p:nvPr>
+        </p:nvSpPr>
+        <p:spPr/>
+        <p:txBody>
+          <a:bodyPr/>
+          <a:lstStyle/>
+          <a:p>
+            <a:pPr algn="l">
+              <a:buFont typeface="Arial" panose="02080604020202020204" pitchFamily="34" charset="0"/>
+              <a:buChar char="•"/>
+            </a:pPr>
+            <a:endParaRPr lang="en-US" altLang="ar-EG" sz="2400" dirty="0">
+              <a:latin typeface="Ubuntu" panose="020B0504030602030204" charset="0"/>
+              <a:cs typeface="Ubuntu" panose="020B0504030602030204" charset="0"/>
+            </a:endParaRPr>
+          </a:p>
+        </p:txBody>
+      </p:sp>
+      <p:pic>
+        <p:nvPicPr>
+          <p:cNvPr id="4" name="Picture 3" descr="A screenshot of a graph&#10;&#10;Description automatically generated"/>
+          <p:cNvPicPr>
+            <a:picLocks noChangeAspect="1"/>
+          </p:cNvPicPr>
+          <p:nvPr/>
+        </p:nvPicPr>
+        <p:blipFill rotWithShape="1">
+          <a:blip r:embed="rId1"/>
+          <a:srcRect l="-585" t="40393" r="75425" b="40013"/>
+          <a:stretch>
+            <a:fillRect/>
+          </a:stretch>
+        </p:blipFill>
+        <p:spPr>
+          <a:xfrm>
+            <a:off x="7124700" y="2490761"/>
+            <a:ext cx="4268913" cy="3324547"/>
+          </a:xfrm>
+          <a:prstGeom prst="rect">
+            <a:avLst/>
+          </a:prstGeom>
+        </p:spPr>
+      </p:pic>
+      <p:sp>
+        <p:nvSpPr>
+          <p:cNvPr id="5" name="Arrow: Right 4"/>
+          <p:cNvSpPr/>
+          <p:nvPr/>
+        </p:nvSpPr>
+        <p:spPr>
+          <a:xfrm>
+            <a:off x="4743450" y="3537530"/>
+            <a:ext cx="2266950" cy="1229263"/>
+          </a:xfrm>
+          <a:prstGeom prst="rightArrow">
+            <a:avLst/>
+          </a:prstGeom>
+        </p:spPr>
+        <p:style>
+          <a:lnRef idx="2">
+            <a:schemeClr val="accent1">
+              <a:shade val="15000"/>
+            </a:schemeClr>
+          </a:lnRef>
+          <a:fillRef idx="1">
+            <a:schemeClr val="accent1"/>
+          </a:fillRef>
+          <a:effectRef idx="0">
+            <a:schemeClr val="accent1"/>
+          </a:effectRef>
+          <a:fontRef idx="minor">
+            <a:schemeClr val="lt1"/>
+          </a:fontRef>
+        </p:style>
+        <p:txBody>
+          <a:bodyPr lIns="91440" tIns="45720" rIns="91440" bIns="45720" rtlCol="0" anchor="ctr"/>
+          <a:lstStyle/>
+          <a:p>
+            <a:pPr algn="ctr"/>
+            <a:r>
+              <a:rPr lang="en-US" sz="2400" dirty="0">
+                <a:cs typeface="Calibri"/>
+              </a:rPr>
+              <a:t>CBRT</a:t>
+            </a:r>
+            <a:endParaRPr lang="en-US" sz="2400" dirty="0"/>
+          </a:p>
+        </p:txBody>
+      </p:sp>
+      <p:pic>
+        <p:nvPicPr>
+          <p:cNvPr id="8" name="Picture 7" descr="A screenshot of a graph&#10;&#10;Description automatically generated"/>
+          <p:cNvPicPr>
+            <a:picLocks noChangeAspect="1"/>
+          </p:cNvPicPr>
+          <p:nvPr/>
+        </p:nvPicPr>
+        <p:blipFill rotWithShape="1">
+          <a:blip r:embed="rId2"/>
+          <a:srcRect t="39847" r="75240" b="40231"/>
+          <a:stretch>
+            <a:fillRect/>
+          </a:stretch>
+        </p:blipFill>
+        <p:spPr>
+          <a:xfrm>
+            <a:off x="478015" y="2490761"/>
+            <a:ext cx="4051797" cy="3260053"/>
+          </a:xfrm>
+          <a:prstGeom prst="rect">
+            <a:avLst/>
+          </a:prstGeom>
+        </p:spPr>
+      </p:pic>
+    </p:spTree>
+  </p:cSld>
+  <p:clrMapOvr>
+    <a:masterClrMapping/>
+  </p:clrMapOvr>
+  <mc:AlternateContent xmlns:mc="http://schemas.openxmlformats.org/markup-compatibility/2006">
+    <mc:Choice xmlns:p14="http://schemas.microsoft.com/office/powerpoint/2010/main" Requires="p14">
+      <p:transition spd="slow" p14:dur="1200"/>
+    </mc:Choice>
+    <mc:Fallback>
+      <p:transition spd="slow"/>
+    </mc:Fallback>
+  </mc:AlternateContent>
+</p:sld>
+</file>
+
+<file path=ppt/slides/slide11.xml><?xml version="1.0" encoding="utf-8"?>
+<p:sld xmlns:a="http://schemas.openxmlformats.org/drawingml/2006/main" xmlns:r="http://schemas.openxmlformats.org/officeDocument/2006/relationships" xmlns:p="http://schemas.openxmlformats.org/presentationml/2006/main">
+  <p:cSld>
+    <p:spTree>
+      <p:nvGrpSpPr>
+        <p:cNvPr id="1" name=""/>
+        <p:cNvGrpSpPr/>
+        <p:nvPr/>
+      </p:nvGrpSpPr>
+      <p:grpSpPr>
+        <a:xfrm>
+          <a:off x="0" y="0"/>
+          <a:ext cx="0" cy="0"/>
+          <a:chOff x="0" y="0"/>
+          <a:chExt cx="0" cy="0"/>
+        </a:xfrm>
+      </p:grpSpPr>
+      <p:sp>
+        <p:nvSpPr>
+          <p:cNvPr id="2" name="Title 1"/>
+          <p:cNvSpPr>
+            <a:spLocks noGrp="1"/>
+          </p:cNvSpPr>
+          <p:nvPr>
+            <p:ph type="title"/>
+          </p:nvPr>
+        </p:nvSpPr>
+        <p:spPr/>
+        <p:txBody>
+          <a:bodyPr/>
+          <a:lstStyle/>
+          <a:p>
+            <a:pPr algn="l"/>
+            <a:r>
+              <a:rPr lang="en-US">
+                <a:latin typeface="Ubuntu" panose="020B0504030602030204" charset="0"/>
+                <a:cs typeface="Ubuntu" panose="020B0504030602030204" charset="0"/>
+              </a:rPr>
+              <a:t>Handle Columns Distribution (cont)</a:t>
+            </a:r>
+            <a:endParaRPr lang="en-US">
+              <a:latin typeface="Ubuntu" panose="020B0504030602030204" charset="0"/>
+              <a:cs typeface="Ubuntu" panose="020B0504030602030204" charset="0"/>
+            </a:endParaRPr>
+          </a:p>
+        </p:txBody>
+      </p:sp>
+      <p:sp>
+        <p:nvSpPr>
+          <p:cNvPr id="3" name="Content Placeholder 2"/>
+          <p:cNvSpPr>
+            <a:spLocks noGrp="1"/>
+          </p:cNvSpPr>
+          <p:nvPr>
+            <p:ph idx="1"/>
+          </p:nvPr>
+        </p:nvSpPr>
+        <p:spPr/>
+        <p:txBody>
+          <a:bodyPr/>
+          <a:lstStyle/>
+          <a:p>
+            <a:pPr algn="l">
+              <a:buFont typeface="Arial" panose="02080604020202020204" pitchFamily="34" charset="0"/>
+              <a:buChar char="•"/>
+            </a:pPr>
+            <a:endParaRPr lang="en-US" altLang="ar-EG" sz="2400" dirty="0">
+              <a:latin typeface="Ubuntu" panose="020B0504030602030204" charset="0"/>
+              <a:cs typeface="Ubuntu" panose="020B0504030602030204" charset="0"/>
+            </a:endParaRPr>
+          </a:p>
+        </p:txBody>
+      </p:sp>
+      <p:pic>
+        <p:nvPicPr>
+          <p:cNvPr id="4" name="Picture 3" descr="A screenshot of a graph&#10;&#10;Description automatically generated"/>
+          <p:cNvPicPr>
+            <a:picLocks noChangeAspect="1"/>
+          </p:cNvPicPr>
+          <p:nvPr/>
+        </p:nvPicPr>
+        <p:blipFill rotWithShape="1">
+          <a:blip r:embed="rId1"/>
+          <a:srcRect l="25019" t="40208" r="49821" b="40198"/>
+          <a:stretch>
+            <a:fillRect/>
+          </a:stretch>
+        </p:blipFill>
+        <p:spPr>
+          <a:xfrm>
+            <a:off x="7124700" y="2490761"/>
+            <a:ext cx="4268913" cy="3324547"/>
+          </a:xfrm>
+          <a:prstGeom prst="rect">
+            <a:avLst/>
+          </a:prstGeom>
+        </p:spPr>
+      </p:pic>
+      <p:sp>
+        <p:nvSpPr>
+          <p:cNvPr id="5" name="Arrow: Right 4"/>
+          <p:cNvSpPr/>
+          <p:nvPr/>
+        </p:nvSpPr>
+        <p:spPr>
+          <a:xfrm>
+            <a:off x="4743450" y="3537530"/>
+            <a:ext cx="2266950" cy="1229263"/>
+          </a:xfrm>
+          <a:prstGeom prst="rightArrow">
+            <a:avLst/>
+          </a:prstGeom>
+        </p:spPr>
+        <p:style>
+          <a:lnRef idx="2">
+            <a:schemeClr val="accent1">
+              <a:shade val="15000"/>
+            </a:schemeClr>
+          </a:lnRef>
+          <a:fillRef idx="1">
+            <a:schemeClr val="accent1"/>
+          </a:fillRef>
+          <a:effectRef idx="0">
+            <a:schemeClr val="accent1"/>
+          </a:effectRef>
+          <a:fontRef idx="minor">
+            <a:schemeClr val="lt1"/>
+          </a:fontRef>
+        </p:style>
+        <p:txBody>
+          <a:bodyPr lIns="91440" tIns="45720" rIns="91440" bIns="45720" rtlCol="0" anchor="ctr"/>
+          <a:lstStyle/>
+          <a:p>
+            <a:pPr algn="ctr"/>
+            <a:r>
+              <a:rPr lang="en-US" sz="2400" dirty="0">
+                <a:cs typeface="Calibri"/>
+              </a:rPr>
+              <a:t>LOG</a:t>
+            </a:r>
+            <a:endParaRPr lang="en-US" sz="2400" dirty="0"/>
+          </a:p>
+        </p:txBody>
+      </p:sp>
+      <p:pic>
+        <p:nvPicPr>
+          <p:cNvPr id="8" name="Picture 7" descr="A screenshot of a graph&#10;&#10;Description automatically generated"/>
+          <p:cNvPicPr>
+            <a:picLocks noChangeAspect="1"/>
+          </p:cNvPicPr>
+          <p:nvPr/>
+        </p:nvPicPr>
+        <p:blipFill rotWithShape="1">
+          <a:blip r:embed="rId2"/>
+          <a:srcRect l="24865" t="39847" r="50375" b="40231"/>
+          <a:stretch>
+            <a:fillRect/>
+          </a:stretch>
+        </p:blipFill>
+        <p:spPr>
+          <a:xfrm>
+            <a:off x="478015" y="2490761"/>
+            <a:ext cx="4051797" cy="3260053"/>
+          </a:xfrm>
+          <a:prstGeom prst="rect">
+            <a:avLst/>
+          </a:prstGeom>
+        </p:spPr>
+      </p:pic>
+    </p:spTree>
+  </p:cSld>
+  <p:clrMapOvr>
+    <a:masterClrMapping/>
+  </p:clrMapOvr>
+  <mc:AlternateContent xmlns:mc="http://schemas.openxmlformats.org/markup-compatibility/2006">
+    <mc:Choice xmlns:p14="http://schemas.microsoft.com/office/powerpoint/2010/main" Requires="p14">
+      <p:transition spd="slow" p14:dur="1200"/>
+    </mc:Choice>
+    <mc:Fallback>
+      <p:transition spd="slow"/>
+    </mc:Fallback>
+  </mc:AlternateContent>
+</p:sld>
+</file>
+
+<file path=ppt/slides/slide12.xml><?xml version="1.0" encoding="utf-8"?>
+<p:sld xmlns:a="http://schemas.openxmlformats.org/drawingml/2006/main" xmlns:r="http://schemas.openxmlformats.org/officeDocument/2006/relationships" xmlns:p="http://schemas.openxmlformats.org/presentationml/2006/main">
+  <p:cSld>
+    <p:spTree>
+      <p:nvGrpSpPr>
+        <p:cNvPr id="1" name=""/>
+        <p:cNvGrpSpPr/>
+        <p:nvPr/>
+      </p:nvGrpSpPr>
+      <p:grpSpPr>
+        <a:xfrm>
+          <a:off x="0" y="0"/>
+          <a:ext cx="0" cy="0"/>
+          <a:chOff x="0" y="0"/>
+          <a:chExt cx="0" cy="0"/>
+        </a:xfrm>
+      </p:grpSpPr>
+      <p:sp>
+        <p:nvSpPr>
+          <p:cNvPr id="2" name="Title 1"/>
+          <p:cNvSpPr>
+            <a:spLocks noGrp="1"/>
+          </p:cNvSpPr>
+          <p:nvPr>
+            <p:ph type="title"/>
+          </p:nvPr>
+        </p:nvSpPr>
+        <p:spPr/>
+        <p:txBody>
+          <a:bodyPr/>
+          <a:lstStyle/>
+          <a:p>
+            <a:pPr algn="l"/>
+            <a:r>
+              <a:rPr lang="en-US">
+                <a:latin typeface="Ubuntu" panose="020B0504030602030204" charset="0"/>
+                <a:cs typeface="Ubuntu" panose="020B0504030602030204" charset="0"/>
+              </a:rPr>
+              <a:t>Handle Columns Distribution (cont)</a:t>
+            </a:r>
+            <a:endParaRPr lang="en-US">
+              <a:latin typeface="Ubuntu" panose="020B0504030602030204" charset="0"/>
+              <a:cs typeface="Ubuntu" panose="020B0504030602030204" charset="0"/>
+            </a:endParaRPr>
+          </a:p>
+        </p:txBody>
+      </p:sp>
+      <p:sp>
+        <p:nvSpPr>
+          <p:cNvPr id="3" name="Content Placeholder 2"/>
+          <p:cNvSpPr>
+            <a:spLocks noGrp="1"/>
+          </p:cNvSpPr>
+          <p:nvPr>
+            <p:ph idx="1"/>
+          </p:nvPr>
+        </p:nvSpPr>
+        <p:spPr/>
+        <p:txBody>
+          <a:bodyPr/>
+          <a:lstStyle/>
+          <a:p>
+            <a:pPr algn="l">
+              <a:buFont typeface="Arial" panose="02080604020202020204" pitchFamily="34" charset="0"/>
+              <a:buChar char="•"/>
+            </a:pPr>
+            <a:endParaRPr lang="en-US" altLang="ar-EG" sz="2400" dirty="0">
+              <a:latin typeface="Ubuntu" panose="020B0504030602030204" charset="0"/>
+              <a:cs typeface="Ubuntu" panose="020B0504030602030204" charset="0"/>
+            </a:endParaRPr>
+          </a:p>
+        </p:txBody>
+      </p:sp>
+      <p:pic>
+        <p:nvPicPr>
+          <p:cNvPr id="4" name="Picture 3" descr="A screenshot of a graph&#10;&#10;Description automatically generated"/>
+          <p:cNvPicPr>
+            <a:picLocks noChangeAspect="1"/>
+          </p:cNvPicPr>
+          <p:nvPr/>
+        </p:nvPicPr>
+        <p:blipFill rotWithShape="1">
+          <a:blip r:embed="rId1"/>
+          <a:srcRect l="674" t="79917" r="74187" b="499"/>
+          <a:stretch>
+            <a:fillRect/>
+          </a:stretch>
+        </p:blipFill>
+        <p:spPr>
+          <a:xfrm>
+            <a:off x="7124700" y="2490761"/>
+            <a:ext cx="4265435" cy="3322800"/>
+          </a:xfrm>
+          <a:prstGeom prst="rect">
+            <a:avLst/>
+          </a:prstGeom>
+        </p:spPr>
+      </p:pic>
+      <p:sp>
+        <p:nvSpPr>
+          <p:cNvPr id="5" name="Arrow: Right 4"/>
+          <p:cNvSpPr/>
+          <p:nvPr/>
+        </p:nvSpPr>
+        <p:spPr>
+          <a:xfrm>
+            <a:off x="4743450" y="3537530"/>
+            <a:ext cx="2266950" cy="1229263"/>
+          </a:xfrm>
+          <a:prstGeom prst="rightArrow">
+            <a:avLst/>
+          </a:prstGeom>
+        </p:spPr>
+        <p:style>
+          <a:lnRef idx="2">
+            <a:schemeClr val="accent1">
+              <a:shade val="15000"/>
+            </a:schemeClr>
+          </a:lnRef>
+          <a:fillRef idx="1">
+            <a:schemeClr val="accent1"/>
+          </a:fillRef>
+          <a:effectRef idx="0">
+            <a:schemeClr val="accent1"/>
+          </a:effectRef>
+          <a:fontRef idx="minor">
+            <a:schemeClr val="lt1"/>
+          </a:fontRef>
+        </p:style>
+        <p:txBody>
+          <a:bodyPr lIns="91440" tIns="45720" rIns="91440" bIns="45720" rtlCol="0" anchor="ctr"/>
+          <a:p>
+            <a:pPr algn="ctr"/>
+            <a:r>
+              <a:rPr lang="en-US" sz="2400" dirty="0">
+                <a:cs typeface="Calibri"/>
+              </a:rPr>
+              <a:t>CBRT</a:t>
+            </a:r>
+            <a:endParaRPr lang="en-US" sz="2400" dirty="0"/>
+          </a:p>
+        </p:txBody>
+      </p:sp>
+      <p:pic>
+        <p:nvPicPr>
+          <p:cNvPr id="8" name="Picture 7" descr="A screenshot of a graph&#10;&#10;Description automatically generated"/>
+          <p:cNvPicPr>
+            <a:picLocks noChangeAspect="1"/>
+          </p:cNvPicPr>
+          <p:nvPr/>
+        </p:nvPicPr>
+        <p:blipFill rotWithShape="1">
+          <a:blip r:embed="rId2"/>
+          <a:srcRect t="79695" r="75251" b="368"/>
+          <a:stretch>
+            <a:fillRect/>
+          </a:stretch>
+        </p:blipFill>
+        <p:spPr>
+          <a:xfrm>
+            <a:off x="478015" y="2490761"/>
+            <a:ext cx="4050030" cy="3262508"/>
+          </a:xfrm>
+          <a:prstGeom prst="rect">
+            <a:avLst/>
+          </a:prstGeom>
+        </p:spPr>
+      </p:pic>
+    </p:spTree>
+  </p:cSld>
+  <p:clrMapOvr>
+    <a:masterClrMapping/>
+  </p:clrMapOvr>
+  <mc:AlternateContent xmlns:mc="http://schemas.openxmlformats.org/markup-compatibility/2006">
+    <mc:Choice xmlns:p14="http://schemas.microsoft.com/office/powerpoint/2010/main" Requires="p14">
+      <p:transition spd="slow" p14:dur="1200"/>
+    </mc:Choice>
+    <mc:Fallback>
+      <p:transition spd="slow"/>
+    </mc:Fallback>
+  </mc:AlternateContent>
+</p:sld>
+</file>
+
+<file path=ppt/slides/slide13.xml><?xml version="1.0" encoding="utf-8"?>
+<p:sld xmlns:a="http://schemas.openxmlformats.org/drawingml/2006/main" xmlns:r="http://schemas.openxmlformats.org/officeDocument/2006/relationships" xmlns:p="http://schemas.openxmlformats.org/presentationml/2006/main">
+  <p:cSld>
+    <p:spTree>
+      <p:nvGrpSpPr>
+        <p:cNvPr id="1" name=""/>
+        <p:cNvGrpSpPr/>
+        <p:nvPr/>
+      </p:nvGrpSpPr>
+      <p:grpSpPr>
+        <a:xfrm>
+          <a:off x="0" y="0"/>
+          <a:ext cx="0" cy="0"/>
+          <a:chOff x="0" y="0"/>
+          <a:chExt cx="0" cy="0"/>
+        </a:xfrm>
+      </p:grpSpPr>
+      <p:sp>
+        <p:nvSpPr>
+          <p:cNvPr id="2" name="Title 1"/>
+          <p:cNvSpPr>
+            <a:spLocks noGrp="1"/>
+          </p:cNvSpPr>
+          <p:nvPr>
+            <p:ph type="title"/>
+          </p:nvPr>
+        </p:nvSpPr>
+        <p:spPr/>
+        <p:txBody>
+          <a:bodyPr/>
+          <a:lstStyle/>
+          <a:p>
+            <a:pPr algn="l"/>
+            <a:r>
+              <a:rPr lang="en-US">
+                <a:latin typeface="Ubuntu" panose="020B0504030602030204" charset="0"/>
+                <a:cs typeface="Ubuntu" panose="020B0504030602030204" charset="0"/>
+              </a:rPr>
+              <a:t>Outline</a:t>
+            </a:r>
+            <a:endParaRPr lang="en-US">
+              <a:latin typeface="Ubuntu" panose="020B0504030602030204" charset="0"/>
+              <a:cs typeface="Ubuntu" panose="020B0504030602030204" charset="0"/>
+            </a:endParaRPr>
+          </a:p>
+        </p:txBody>
+      </p:sp>
+      <p:sp>
+        <p:nvSpPr>
+          <p:cNvPr id="3" name="Content Placeholder 2"/>
+          <p:cNvSpPr>
+            <a:spLocks noGrp="1"/>
+          </p:cNvSpPr>
+          <p:nvPr>
+            <p:ph idx="1"/>
+          </p:nvPr>
+        </p:nvSpPr>
+        <p:spPr/>
+        <p:txBody>
+          <a:bodyPr/>
+          <a:lstStyle/>
+          <a:p>
+            <a:pPr marL="457200" indent="-457200" algn="l">
+              <a:buFont typeface="+mj-lt"/>
+              <a:buAutoNum type="arabicPeriod"/>
+            </a:pPr>
+            <a:r>
+              <a:rPr lang="en-US" altLang="ar-EG" sz="2400" dirty="0">
+                <a:solidFill>
+                  <a:schemeClr val="accent3">
+                    <a:lumMod val="65000"/>
+                  </a:schemeClr>
+                </a:solidFill>
+                <a:latin typeface="Ubuntu" panose="020B0504030602030204" charset="0"/>
+                <a:cs typeface="Ubuntu" panose="020B0504030602030204" charset="0"/>
+              </a:rPr>
+              <a:t>Handle Columns Distribution</a:t>
+            </a:r>
+            <a:endParaRPr lang="en-US" altLang="ar-EG" sz="2400" dirty="0">
+              <a:solidFill>
+                <a:schemeClr val="accent3">
+                  <a:lumMod val="65000"/>
+                </a:schemeClr>
+              </a:solidFill>
+              <a:latin typeface="Ubuntu" panose="020B0504030602030204" charset="0"/>
+              <a:cs typeface="Ubuntu" panose="020B0504030602030204" charset="0"/>
+            </a:endParaRPr>
+          </a:p>
+          <a:p>
+            <a:pPr marL="457200" indent="-457200" algn="l">
+              <a:buFont typeface="+mj-lt"/>
+              <a:buAutoNum type="arabicPeriod"/>
+            </a:pPr>
+            <a:r>
+              <a:rPr lang="en-US" altLang="ar-EG" sz="2400" dirty="0">
+                <a:latin typeface="Ubuntu" panose="020B0504030602030204" charset="0"/>
+                <a:cs typeface="Ubuntu" panose="020B0504030602030204" charset="0"/>
+              </a:rPr>
+              <a:t>Data Unity</a:t>
+            </a:r>
+            <a:endParaRPr lang="en-US" altLang="ar-EG" sz="2400" dirty="0">
+              <a:latin typeface="Ubuntu" panose="020B0504030602030204" charset="0"/>
+              <a:cs typeface="Ubuntu" panose="020B0504030602030204" charset="0"/>
+            </a:endParaRPr>
+          </a:p>
+          <a:p>
+            <a:pPr marL="457200" indent="-457200" algn="l">
+              <a:buFont typeface="+mj-lt"/>
+              <a:buAutoNum type="arabicPeriod"/>
+            </a:pPr>
+            <a:r>
+              <a:rPr lang="en-US" altLang="ar-EG" sz="2400" dirty="0">
+                <a:solidFill>
+                  <a:schemeClr val="accent3">
+                    <a:lumMod val="65000"/>
+                  </a:schemeClr>
+                </a:solidFill>
+                <a:latin typeface="Ubuntu" panose="020B0504030602030204" charset="0"/>
+                <a:cs typeface="Ubuntu" panose="020B0504030602030204" charset="0"/>
+              </a:rPr>
+              <a:t>Data Balancing</a:t>
+            </a:r>
+            <a:endParaRPr lang="en-US" altLang="ar-EG" sz="2400" dirty="0">
+              <a:solidFill>
+                <a:schemeClr val="accent3">
+                  <a:lumMod val="65000"/>
+                </a:schemeClr>
+              </a:solidFill>
+              <a:latin typeface="Ubuntu" panose="020B0504030602030204" charset="0"/>
+              <a:cs typeface="Ubuntu" panose="020B0504030602030204" charset="0"/>
+            </a:endParaRPr>
+          </a:p>
+          <a:p>
+            <a:pPr marL="457200" indent="-457200" algn="l">
+              <a:buFont typeface="+mj-lt"/>
+              <a:buAutoNum type="arabicPeriod"/>
+            </a:pPr>
+            <a:r>
+              <a:rPr lang="en-US" altLang="ar-EG" sz="2400" dirty="0">
+                <a:solidFill>
+                  <a:schemeClr val="accent3">
+                    <a:lumMod val="65000"/>
+                  </a:schemeClr>
+                </a:solidFill>
+                <a:latin typeface="Ubuntu" panose="020B0504030602030204" charset="0"/>
+                <a:cs typeface="Ubuntu" panose="020B0504030602030204" charset="0"/>
+              </a:rPr>
+              <a:t>Lab</a:t>
+            </a:r>
+            <a:endParaRPr lang="en-US" altLang="ar-EG" sz="2400" dirty="0">
+              <a:solidFill>
+                <a:schemeClr val="accent3">
+                  <a:lumMod val="65000"/>
+                </a:schemeClr>
+              </a:solidFill>
+              <a:latin typeface="Ubuntu" panose="020B0504030602030204" charset="0"/>
+              <a:cs typeface="Ubuntu" panose="020B0504030602030204" charset="0"/>
+            </a:endParaRPr>
+          </a:p>
+        </p:txBody>
+      </p:sp>
+    </p:spTree>
+  </p:cSld>
+  <p:clrMapOvr>
+    <a:masterClrMapping/>
+  </p:clrMapOvr>
+  <mc:AlternateContent xmlns:mc="http://schemas.openxmlformats.org/markup-compatibility/2006">
+    <mc:Choice xmlns:p14="http://schemas.microsoft.com/office/powerpoint/2010/main" Requires="p14">
+      <p:transition spd="slow" p14:dur="1200"/>
+    </mc:Choice>
+    <mc:Fallback>
+      <p:transition spd="slow"/>
+    </mc:Fallback>
+  </mc:AlternateContent>
+</p:sld>
+</file>
+
+<file path=ppt/slides/slide14.xml><?xml version="1.0" encoding="utf-8"?>
+<p:sld xmlns:a="http://schemas.openxmlformats.org/drawingml/2006/main" xmlns:r="http://schemas.openxmlformats.org/officeDocument/2006/relationships" xmlns:p="http://schemas.openxmlformats.org/presentationml/2006/main">
+  <p:cSld>
+    <p:spTree>
+      <p:nvGrpSpPr>
+        <p:cNvPr id="1" name=""/>
+        <p:cNvGrpSpPr/>
+        <p:nvPr/>
+      </p:nvGrpSpPr>
+      <p:grpSpPr>
+        <a:xfrm>
+          <a:off x="0" y="0"/>
+          <a:ext cx="0" cy="0"/>
+          <a:chOff x="0" y="0"/>
+          <a:chExt cx="0" cy="0"/>
+        </a:xfrm>
+      </p:grpSpPr>
+      <p:sp>
+        <p:nvSpPr>
+          <p:cNvPr id="2" name="Title 1"/>
+          <p:cNvSpPr>
+            <a:spLocks noGrp="1"/>
+          </p:cNvSpPr>
+          <p:nvPr>
+            <p:ph type="title"/>
+          </p:nvPr>
+        </p:nvSpPr>
+        <p:spPr/>
+        <p:txBody>
+          <a:bodyPr/>
+          <a:lstStyle/>
+          <a:p>
+            <a:pPr algn="l"/>
+            <a:r>
+              <a:rPr lang="en-US">
+                <a:latin typeface="Ubuntu" panose="020B0504030602030204" charset="0"/>
+                <a:cs typeface="Ubuntu" panose="020B0504030602030204" charset="0"/>
+              </a:rPr>
+              <a:t>Data Unity</a:t>
+            </a:r>
+            <a:endParaRPr lang="en-US">
+              <a:latin typeface="Ubuntu" panose="020B0504030602030204" charset="0"/>
+              <a:cs typeface="Ubuntu" panose="020B0504030602030204" charset="0"/>
+            </a:endParaRPr>
+          </a:p>
+        </p:txBody>
+      </p:sp>
+      <p:sp>
+        <p:nvSpPr>
+          <p:cNvPr id="3" name="Content Placeholder 2"/>
+          <p:cNvSpPr>
+            <a:spLocks noGrp="1"/>
+          </p:cNvSpPr>
+          <p:nvPr>
+            <p:ph idx="1"/>
+          </p:nvPr>
+        </p:nvSpPr>
+        <p:spPr/>
+        <p:txBody>
+          <a:bodyPr/>
+          <a:lstStyle/>
+          <a:p>
+            <a:pPr algn="l">
+              <a:buFont typeface="Arial" panose="02080604020202020204" pitchFamily="34" charset="0"/>
+              <a:buChar char="•"/>
+            </a:pPr>
+            <a:r>
+              <a:rPr lang="en-US" altLang="ar-EG" sz="2400" b="1" dirty="0">
+                <a:latin typeface="Ubuntu" panose="020B0504030602030204" charset="0"/>
+                <a:cs typeface="Ubuntu" panose="020B0504030602030204" charset="0"/>
+              </a:rPr>
+              <a:t>Data Types and Formats: </a:t>
+            </a:r>
+            <a:r>
+              <a:rPr lang="en-US" altLang="ar-EG" sz="2400" dirty="0">
+                <a:latin typeface="Ubuntu" panose="020B0504030602030204" charset="0"/>
+                <a:cs typeface="Ubuntu" panose="020B0504030602030204" charset="0"/>
+              </a:rPr>
+              <a:t>Ensure consistency in data types (numeric, categorical, datetime, etc.) and formats (text, numerical, categorical codes, etc.).</a:t>
+            </a:r>
+            <a:endParaRPr lang="en-US" altLang="ar-EG" sz="2400" dirty="0">
+              <a:latin typeface="Ubuntu" panose="020B0504030602030204" charset="0"/>
+              <a:cs typeface="Ubuntu" panose="020B0504030602030204" charset="0"/>
+            </a:endParaRPr>
+          </a:p>
+          <a:p>
+            <a:pPr algn="l">
+              <a:buFont typeface="Arial" panose="02080604020202020204" pitchFamily="34" charset="0"/>
+              <a:buChar char="•"/>
+            </a:pPr>
+            <a:r>
+              <a:rPr lang="en-US" altLang="ar-EG" sz="2400" b="1" dirty="0">
+                <a:latin typeface="Ubuntu" panose="020B0504030602030204" charset="0"/>
+                <a:cs typeface="Ubuntu" panose="020B0504030602030204" charset="0"/>
+              </a:rPr>
+              <a:t>Unit and Scale Consistency:</a:t>
+            </a:r>
+            <a:r>
+              <a:rPr lang="en-US" altLang="ar-EG" sz="2400" dirty="0">
+                <a:latin typeface="Ubuntu" panose="020B0504030602030204" charset="0"/>
+                <a:cs typeface="Ubuntu" panose="020B0504030602030204" charset="0"/>
+              </a:rPr>
+              <a:t> Check if units and scales are consistent across different columns. Normalize or standardize data as needed.</a:t>
+            </a:r>
+            <a:endParaRPr lang="en-US" altLang="ar-EG" sz="2400" dirty="0">
+              <a:latin typeface="Ubuntu" panose="020B0504030602030204" charset="0"/>
+              <a:cs typeface="Ubuntu" panose="020B0504030602030204" charset="0"/>
+            </a:endParaRPr>
+          </a:p>
+          <a:p>
+            <a:pPr algn="l">
+              <a:buFont typeface="Arial" panose="02080604020202020204" pitchFamily="34" charset="0"/>
+              <a:buChar char="•"/>
+            </a:pPr>
+            <a:r>
+              <a:rPr lang="en-US" altLang="ar-EG" sz="2400" b="1" dirty="0">
+                <a:latin typeface="Ubuntu" panose="020B0504030602030204" charset="0"/>
+                <a:cs typeface="Ubuntu" panose="020B0504030602030204" charset="0"/>
+              </a:rPr>
+              <a:t>Feature Splitting:</a:t>
+            </a:r>
+            <a:r>
+              <a:rPr lang="en-US" altLang="ar-EG" sz="2400" dirty="0">
+                <a:latin typeface="Ubuntu" panose="020B0504030602030204" charset="0"/>
+                <a:cs typeface="Ubuntu" panose="020B0504030602030204" charset="0"/>
+              </a:rPr>
+              <a:t> Split composite features like full names into first and last names for improved model interpretability.</a:t>
+            </a:r>
+            <a:endParaRPr lang="en-US" altLang="ar-EG" sz="2400" dirty="0">
+              <a:latin typeface="Ubuntu" panose="020B0504030602030204" charset="0"/>
+              <a:cs typeface="Ubuntu" panose="020B0504030602030204" charset="0"/>
+            </a:endParaRPr>
+          </a:p>
+        </p:txBody>
+      </p:sp>
+    </p:spTree>
+  </p:cSld>
+  <p:clrMapOvr>
+    <a:masterClrMapping/>
+  </p:clrMapOvr>
+  <mc:AlternateContent xmlns:mc="http://schemas.openxmlformats.org/markup-compatibility/2006">
+    <mc:Choice xmlns:p14="http://schemas.microsoft.com/office/powerpoint/2010/main" Requires="p14">
+      <p:transition spd="slow" p14:dur="1200"/>
+    </mc:Choice>
+    <mc:Fallback>
+      <p:transition spd="slow"/>
+    </mc:Fallback>
+  </mc:AlternateContent>
+</p:sld>
+</file>
+
+<file path=ppt/slides/slide15.xml><?xml version="1.0" encoding="utf-8"?>
+<p:sld xmlns:a="http://schemas.openxmlformats.org/drawingml/2006/main" xmlns:r="http://schemas.openxmlformats.org/officeDocument/2006/relationships" xmlns:p="http://schemas.openxmlformats.org/presentationml/2006/main">
+  <p:cSld>
+    <p:spTree>
+      <p:nvGrpSpPr>
+        <p:cNvPr id="1" name=""/>
+        <p:cNvGrpSpPr/>
+        <p:nvPr/>
+      </p:nvGrpSpPr>
+      <p:grpSpPr>
+        <a:xfrm>
+          <a:off x="0" y="0"/>
+          <a:ext cx="0" cy="0"/>
+          <a:chOff x="0" y="0"/>
+          <a:chExt cx="0" cy="0"/>
+        </a:xfrm>
+      </p:grpSpPr>
+      <p:sp>
+        <p:nvSpPr>
+          <p:cNvPr id="2" name="Title 1"/>
+          <p:cNvSpPr>
+            <a:spLocks noGrp="1"/>
+          </p:cNvSpPr>
+          <p:nvPr>
+            <p:ph type="title"/>
+          </p:nvPr>
+        </p:nvSpPr>
+        <p:spPr/>
+        <p:txBody>
+          <a:bodyPr/>
+          <a:lstStyle/>
+          <a:p>
+            <a:pPr algn="l"/>
+            <a:r>
+              <a:rPr lang="en-US">
+                <a:latin typeface="Ubuntu" panose="020B0504030602030204" charset="0"/>
+                <a:cs typeface="Ubuntu" panose="020B0504030602030204" charset="0"/>
+              </a:rPr>
+              <a:t>Outline</a:t>
+            </a:r>
+            <a:endParaRPr lang="en-US">
+              <a:latin typeface="Ubuntu" panose="020B0504030602030204" charset="0"/>
+              <a:cs typeface="Ubuntu" panose="020B0504030602030204" charset="0"/>
+            </a:endParaRPr>
+          </a:p>
+        </p:txBody>
+      </p:sp>
+      <p:sp>
+        <p:nvSpPr>
+          <p:cNvPr id="3" name="Content Placeholder 2"/>
+          <p:cNvSpPr>
+            <a:spLocks noGrp="1"/>
+          </p:cNvSpPr>
+          <p:nvPr>
+            <p:ph idx="1"/>
+          </p:nvPr>
+        </p:nvSpPr>
+        <p:spPr/>
+        <p:txBody>
+          <a:bodyPr/>
+          <a:lstStyle/>
+          <a:p>
+            <a:pPr marL="457200" indent="-457200" algn="l">
+              <a:buFont typeface="+mj-lt"/>
+              <a:buAutoNum type="arabicPeriod"/>
+            </a:pPr>
+            <a:r>
+              <a:rPr lang="en-US" altLang="ar-EG" sz="2400" dirty="0">
+                <a:solidFill>
+                  <a:schemeClr val="accent3">
+                    <a:lumMod val="65000"/>
+                  </a:schemeClr>
+                </a:solidFill>
+                <a:latin typeface="Ubuntu" panose="020B0504030602030204" charset="0"/>
+                <a:cs typeface="Ubuntu" panose="020B0504030602030204" charset="0"/>
+              </a:rPr>
+              <a:t>Handle Columns Distribution</a:t>
+            </a:r>
+            <a:endParaRPr lang="en-US" altLang="ar-EG" sz="2400" dirty="0">
+              <a:solidFill>
+                <a:schemeClr val="accent3">
+                  <a:lumMod val="65000"/>
+                </a:schemeClr>
+              </a:solidFill>
+              <a:latin typeface="Ubuntu" panose="020B0504030602030204" charset="0"/>
+              <a:cs typeface="Ubuntu" panose="020B0504030602030204" charset="0"/>
+            </a:endParaRPr>
+          </a:p>
+          <a:p>
+            <a:pPr marL="457200" indent="-457200" algn="l">
+              <a:buFont typeface="+mj-lt"/>
+              <a:buAutoNum type="arabicPeriod"/>
+            </a:pPr>
+            <a:r>
+              <a:rPr lang="en-US" altLang="ar-EG" sz="2400" dirty="0">
+                <a:solidFill>
+                  <a:schemeClr val="accent3">
+                    <a:lumMod val="65000"/>
+                  </a:schemeClr>
+                </a:solidFill>
+                <a:latin typeface="Ubuntu" panose="020B0504030602030204" charset="0"/>
+                <a:cs typeface="Ubuntu" panose="020B0504030602030204" charset="0"/>
+              </a:rPr>
+              <a:t>Data Unity</a:t>
+            </a:r>
+            <a:endParaRPr lang="en-US" altLang="ar-EG" sz="2400" dirty="0">
+              <a:solidFill>
+                <a:schemeClr val="accent3">
+                  <a:lumMod val="65000"/>
+                </a:schemeClr>
+              </a:solidFill>
+              <a:latin typeface="Ubuntu" panose="020B0504030602030204" charset="0"/>
+              <a:cs typeface="Ubuntu" panose="020B0504030602030204" charset="0"/>
+            </a:endParaRPr>
+          </a:p>
+          <a:p>
+            <a:pPr marL="457200" indent="-457200" algn="l">
+              <a:buFont typeface="+mj-lt"/>
+              <a:buAutoNum type="arabicPeriod"/>
+            </a:pPr>
+            <a:r>
+              <a:rPr lang="en-US" altLang="ar-EG" sz="2400" dirty="0">
+                <a:latin typeface="Ubuntu" panose="020B0504030602030204" charset="0"/>
+                <a:cs typeface="Ubuntu" panose="020B0504030602030204" charset="0"/>
+              </a:rPr>
+              <a:t>Data Balancing</a:t>
+            </a:r>
+            <a:endParaRPr lang="en-US" altLang="ar-EG" sz="2400" dirty="0">
+              <a:latin typeface="Ubuntu" panose="020B0504030602030204" charset="0"/>
+              <a:cs typeface="Ubuntu" panose="020B0504030602030204" charset="0"/>
+            </a:endParaRPr>
+          </a:p>
+          <a:p>
+            <a:pPr marL="457200" indent="-457200" algn="l">
+              <a:buFont typeface="+mj-lt"/>
+              <a:buAutoNum type="arabicPeriod"/>
+            </a:pPr>
+            <a:r>
+              <a:rPr lang="en-US" altLang="ar-EG" sz="2400" dirty="0">
+                <a:solidFill>
+                  <a:schemeClr val="accent3">
+                    <a:lumMod val="65000"/>
+                  </a:schemeClr>
+                </a:solidFill>
+                <a:latin typeface="Ubuntu" panose="020B0504030602030204" charset="0"/>
+                <a:cs typeface="Ubuntu" panose="020B0504030602030204" charset="0"/>
+              </a:rPr>
+              <a:t>Lab</a:t>
+            </a:r>
+            <a:endParaRPr lang="en-US" altLang="ar-EG" sz="2400" dirty="0">
+              <a:solidFill>
+                <a:schemeClr val="accent3">
+                  <a:lumMod val="65000"/>
+                </a:schemeClr>
+              </a:solidFill>
+              <a:latin typeface="Ubuntu" panose="020B0504030602030204" charset="0"/>
+              <a:cs typeface="Ubuntu" panose="020B0504030602030204" charset="0"/>
+            </a:endParaRPr>
+          </a:p>
+        </p:txBody>
+      </p:sp>
+    </p:spTree>
+  </p:cSld>
+  <p:clrMapOvr>
+    <a:masterClrMapping/>
+  </p:clrMapOvr>
+  <mc:AlternateContent xmlns:mc="http://schemas.openxmlformats.org/markup-compatibility/2006">
+    <mc:Choice xmlns:p14="http://schemas.microsoft.com/office/powerpoint/2010/main" Requires="p14">
+      <p:transition spd="slow" p14:dur="1200"/>
+    </mc:Choice>
+    <mc:Fallback>
+      <p:transition spd="slow"/>
+    </mc:Fallback>
+  </mc:AlternateContent>
+</p:sld>
+</file>
+
+<file path=ppt/slides/slide16.xml><?xml version="1.0" encoding="utf-8"?>
+<p:sld xmlns:a="http://schemas.openxmlformats.org/drawingml/2006/main" xmlns:r="http://schemas.openxmlformats.org/officeDocument/2006/relationships" xmlns:p="http://schemas.openxmlformats.org/presentationml/2006/main">
+  <p:cSld>
+    <p:spTree>
+      <p:nvGrpSpPr>
+        <p:cNvPr id="1" name=""/>
+        <p:cNvGrpSpPr/>
+        <p:nvPr/>
+      </p:nvGrpSpPr>
+      <p:grpSpPr>
+        <a:xfrm>
+          <a:off x="0" y="0"/>
+          <a:ext cx="0" cy="0"/>
+          <a:chOff x="0" y="0"/>
+          <a:chExt cx="0" cy="0"/>
+        </a:xfrm>
+      </p:grpSpPr>
+      <p:sp>
+        <p:nvSpPr>
+          <p:cNvPr id="2" name="Title 1"/>
+          <p:cNvSpPr>
+            <a:spLocks noGrp="1"/>
+          </p:cNvSpPr>
+          <p:nvPr>
+            <p:ph type="title"/>
+          </p:nvPr>
+        </p:nvSpPr>
+        <p:spPr/>
+        <p:txBody>
+          <a:bodyPr/>
+          <a:lstStyle/>
+          <a:p>
+            <a:pPr algn="l"/>
+            <a:r>
+              <a:rPr lang="en-US">
+                <a:latin typeface="Ubuntu" panose="020B0504030602030204" charset="0"/>
+                <a:cs typeface="Ubuntu" panose="020B0504030602030204" charset="0"/>
+              </a:rPr>
+              <a:t>Data Balancing</a:t>
+            </a:r>
+            <a:endParaRPr lang="en-US">
+              <a:latin typeface="Ubuntu" panose="020B0504030602030204" charset="0"/>
+              <a:cs typeface="Ubuntu" panose="020B0504030602030204" charset="0"/>
+            </a:endParaRPr>
+          </a:p>
+        </p:txBody>
+      </p:sp>
+      <p:pic>
+        <p:nvPicPr>
+          <p:cNvPr id="4" name="Content Placeholder 3"/>
+          <p:cNvPicPr>
+            <a:picLocks noChangeAspect="1"/>
+          </p:cNvPicPr>
+          <p:nvPr>
+            <p:ph idx="1"/>
+          </p:nvPr>
+        </p:nvPicPr>
+        <p:blipFill>
+          <a:blip r:embed="rId1"/>
+          <a:stretch>
+            <a:fillRect/>
+          </a:stretch>
+        </p:blipFill>
+        <p:spPr>
+          <a:xfrm>
+            <a:off x="609600" y="2178050"/>
+            <a:ext cx="10972800" cy="3369945"/>
+          </a:xfrm>
+          <a:prstGeom prst="rect">
+            <a:avLst/>
+          </a:prstGeom>
+        </p:spPr>
+      </p:pic>
+    </p:spTree>
+  </p:cSld>
+  <p:clrMapOvr>
+    <a:masterClrMapping/>
+  </p:clrMapOvr>
+  <mc:AlternateContent xmlns:mc="http://schemas.openxmlformats.org/markup-compatibility/2006">
+    <mc:Choice xmlns:p14="http://schemas.microsoft.com/office/powerpoint/2010/main" Requires="p14">
+      <p:transition spd="slow" p14:dur="1200"/>
+    </mc:Choice>
+    <mc:Fallback>
+      <p:transition spd="slow"/>
+    </mc:Fallback>
+  </mc:AlternateContent>
+</p:sld>
+</file>
+
+<file path=ppt/slides/slide17.xml><?xml version="1.0" encoding="utf-8"?>
+<p:sld xmlns:a="http://schemas.openxmlformats.org/drawingml/2006/main" xmlns:r="http://schemas.openxmlformats.org/officeDocument/2006/relationships" xmlns:p="http://schemas.openxmlformats.org/presentationml/2006/main">
+  <p:cSld>
+    <p:spTree>
+      <p:nvGrpSpPr>
+        <p:cNvPr id="1" name=""/>
+        <p:cNvGrpSpPr/>
+        <p:nvPr/>
+      </p:nvGrpSpPr>
+      <p:grpSpPr>
+        <a:xfrm>
+          <a:off x="0" y="0"/>
+          <a:ext cx="0" cy="0"/>
+          <a:chOff x="0" y="0"/>
+          <a:chExt cx="0" cy="0"/>
+        </a:xfrm>
+      </p:grpSpPr>
+      <p:sp>
+        <p:nvSpPr>
+          <p:cNvPr id="2" name="Title 1"/>
+          <p:cNvSpPr>
+            <a:spLocks noGrp="1"/>
+          </p:cNvSpPr>
+          <p:nvPr>
+            <p:ph type="title"/>
+          </p:nvPr>
+        </p:nvSpPr>
+        <p:spPr/>
+        <p:txBody>
+          <a:bodyPr/>
+          <a:lstStyle/>
+          <a:p>
+            <a:pPr algn="l"/>
+            <a:r>
+              <a:rPr lang="en-US">
+                <a:latin typeface="Ubuntu" panose="020B0504030602030204" charset="0"/>
+                <a:cs typeface="Ubuntu" panose="020B0504030602030204" charset="0"/>
+              </a:rPr>
+              <a:t>Outline</a:t>
+            </a:r>
+            <a:endParaRPr lang="en-US">
+              <a:latin typeface="Ubuntu" panose="020B0504030602030204" charset="0"/>
+              <a:cs typeface="Ubuntu" panose="020B0504030602030204" charset="0"/>
+            </a:endParaRPr>
+          </a:p>
+        </p:txBody>
+      </p:sp>
+      <p:sp>
+        <p:nvSpPr>
+          <p:cNvPr id="3" name="Content Placeholder 2"/>
+          <p:cNvSpPr>
+            <a:spLocks noGrp="1"/>
+          </p:cNvSpPr>
+          <p:nvPr>
+            <p:ph idx="1"/>
+          </p:nvPr>
+        </p:nvSpPr>
+        <p:spPr/>
+        <p:txBody>
+          <a:bodyPr/>
+          <a:lstStyle/>
+          <a:p>
+            <a:pPr marL="457200" indent="-457200" algn="l">
+              <a:buFont typeface="+mj-lt"/>
+              <a:buAutoNum type="arabicPeriod"/>
+            </a:pPr>
+            <a:r>
+              <a:rPr lang="en-US" altLang="ar-EG" sz="2400" dirty="0">
+                <a:solidFill>
+                  <a:schemeClr val="accent3">
+                    <a:lumMod val="65000"/>
+                  </a:schemeClr>
+                </a:solidFill>
+                <a:latin typeface="Ubuntu" panose="020B0504030602030204" charset="0"/>
+                <a:cs typeface="Ubuntu" panose="020B0504030602030204" charset="0"/>
+              </a:rPr>
+              <a:t>Handle Columns Distribution</a:t>
+            </a:r>
+            <a:endParaRPr lang="en-US" altLang="ar-EG" sz="2400" dirty="0">
+              <a:solidFill>
+                <a:schemeClr val="accent3">
+                  <a:lumMod val="65000"/>
+                </a:schemeClr>
+              </a:solidFill>
+              <a:latin typeface="Ubuntu" panose="020B0504030602030204" charset="0"/>
+              <a:cs typeface="Ubuntu" panose="020B0504030602030204" charset="0"/>
+            </a:endParaRPr>
+          </a:p>
+          <a:p>
+            <a:pPr marL="457200" indent="-457200" algn="l">
+              <a:buFont typeface="+mj-lt"/>
+              <a:buAutoNum type="arabicPeriod"/>
+            </a:pPr>
+            <a:r>
+              <a:rPr lang="en-US" altLang="ar-EG" sz="2400" dirty="0">
+                <a:solidFill>
+                  <a:schemeClr val="accent3">
+                    <a:lumMod val="65000"/>
+                  </a:schemeClr>
+                </a:solidFill>
+                <a:latin typeface="Ubuntu" panose="020B0504030602030204" charset="0"/>
+                <a:cs typeface="Ubuntu" panose="020B0504030602030204" charset="0"/>
+              </a:rPr>
+              <a:t>Data Unity</a:t>
+            </a:r>
+            <a:endParaRPr lang="en-US" altLang="ar-EG" sz="2400" dirty="0">
+              <a:solidFill>
+                <a:schemeClr val="accent3">
+                  <a:lumMod val="65000"/>
+                </a:schemeClr>
+              </a:solidFill>
+              <a:latin typeface="Ubuntu" panose="020B0504030602030204" charset="0"/>
+              <a:cs typeface="Ubuntu" panose="020B0504030602030204" charset="0"/>
+            </a:endParaRPr>
+          </a:p>
+          <a:p>
+            <a:pPr marL="457200" indent="-457200" algn="l">
+              <a:buFont typeface="+mj-lt"/>
+              <a:buAutoNum type="arabicPeriod"/>
+            </a:pPr>
+            <a:r>
+              <a:rPr lang="en-US" altLang="ar-EG" sz="2400" dirty="0">
+                <a:solidFill>
+                  <a:schemeClr val="accent3">
+                    <a:lumMod val="65000"/>
+                  </a:schemeClr>
+                </a:solidFill>
+                <a:latin typeface="Ubuntu" panose="020B0504030602030204" charset="0"/>
+                <a:cs typeface="Ubuntu" panose="020B0504030602030204" charset="0"/>
+              </a:rPr>
+              <a:t>Data Balancing</a:t>
+            </a:r>
+            <a:endParaRPr lang="en-US" altLang="ar-EG" sz="2400" dirty="0">
+              <a:solidFill>
+                <a:schemeClr val="accent3">
+                  <a:lumMod val="65000"/>
+                </a:schemeClr>
+              </a:solidFill>
+              <a:latin typeface="Ubuntu" panose="020B0504030602030204" charset="0"/>
+              <a:cs typeface="Ubuntu" panose="020B0504030602030204" charset="0"/>
+            </a:endParaRPr>
+          </a:p>
+          <a:p>
+            <a:pPr marL="457200" indent="-457200" algn="l">
+              <a:buFont typeface="+mj-lt"/>
+              <a:buAutoNum type="arabicPeriod"/>
+            </a:pPr>
+            <a:r>
+              <a:rPr lang="en-US" altLang="ar-EG" sz="2400" dirty="0">
+                <a:latin typeface="Ubuntu" panose="020B0504030602030204" charset="0"/>
+                <a:cs typeface="Ubuntu" panose="020B0504030602030204" charset="0"/>
+              </a:rPr>
+              <a:t>Lab</a:t>
+            </a:r>
+            <a:endParaRPr lang="en-US" altLang="ar-EG" sz="2400" dirty="0">
+              <a:latin typeface="Ubuntu" panose="020B0504030602030204" charset="0"/>
+              <a:cs typeface="Ubuntu" panose="020B0504030602030204" charset="0"/>
+            </a:endParaRPr>
+          </a:p>
+        </p:txBody>
+      </p:sp>
+    </p:spTree>
+  </p:cSld>
+  <p:clrMapOvr>
+    <a:masterClrMapping/>
+  </p:clrMapOvr>
+  <mc:AlternateContent xmlns:mc="http://schemas.openxmlformats.org/markup-compatibility/2006">
+    <mc:Choice xmlns:p14="http://schemas.microsoft.com/office/powerpoint/2010/main" Requires="p14">
+      <p:transition spd="slow" p14:dur="1200"/>
+    </mc:Choice>
+    <mc:Fallback>
+      <p:transition spd="slow"/>
+    </mc:Fallback>
+  </mc:AlternateContent>
+</p:sld>
+</file>
+
+<file path=ppt/slides/slide18.xml><?xml version="1.0" encoding="utf-8"?>
+<p:sld xmlns:a="http://schemas.openxmlformats.org/drawingml/2006/main" xmlns:r="http://schemas.openxmlformats.org/officeDocument/2006/relationships" xmlns:p="http://schemas.openxmlformats.org/presentationml/2006/main">
+  <p:cSld>
+    <p:spTree>
+      <p:nvGrpSpPr>
+        <p:cNvPr id="1" name=""/>
+        <p:cNvGrpSpPr/>
+        <p:nvPr/>
+      </p:nvGrpSpPr>
+      <p:grpSpPr>
+        <a:xfrm>
+          <a:off x="0" y="0"/>
+          <a:ext cx="0" cy="0"/>
+          <a:chOff x="0" y="0"/>
+          <a:chExt cx="0" cy="0"/>
+        </a:xfrm>
+      </p:grpSpPr>
+      <p:sp>
+        <p:nvSpPr>
+          <p:cNvPr id="2" name="Title 1"/>
+          <p:cNvSpPr>
+            <a:spLocks noGrp="1"/>
+          </p:cNvSpPr>
+          <p:nvPr>
+            <p:ph type="title"/>
+          </p:nvPr>
+        </p:nvSpPr>
+        <p:spPr/>
+        <p:txBody>
+          <a:bodyPr/>
+          <a:lstStyle/>
+          <a:p>
+            <a:pPr algn="l"/>
+            <a:r>
+              <a:rPr lang="en-US" altLang="ar-EG" dirty="0">
+                <a:latin typeface="Ubuntu" panose="020B0504030602030204" charset="0"/>
+                <a:cs typeface="Ubuntu" panose="020B0504030602030204" charset="0"/>
+                <a:sym typeface="+mn-ea"/>
+              </a:rPr>
+              <a:t>Lab</a:t>
+            </a:r>
+            <a:endParaRPr lang="en-US" altLang="ar-EG" dirty="0">
+              <a:latin typeface="Ubuntu" panose="020B0504030602030204" charset="0"/>
+              <a:cs typeface="Ubuntu" panose="020B0504030602030204" charset="0"/>
+              <a:sym typeface="+mn-ea"/>
+            </a:endParaRPr>
+          </a:p>
+        </p:txBody>
+      </p:sp>
+      <p:sp>
+        <p:nvSpPr>
+          <p:cNvPr id="3" name="Content Placeholder 2"/>
+          <p:cNvSpPr>
+            <a:spLocks noGrp="1"/>
+          </p:cNvSpPr>
+          <p:nvPr>
+            <p:ph idx="1"/>
+          </p:nvPr>
+        </p:nvSpPr>
+        <p:spPr/>
+        <p:txBody>
+          <a:bodyPr/>
+          <a:lstStyle/>
+          <a:p>
+            <a:pPr marL="0" indent="0" algn="l">
+              <a:buNone/>
+            </a:pPr>
+            <a:r>
+              <a:rPr lang="en-US" altLang="ar-EG" sz="2400" dirty="0">
+                <a:latin typeface="Ubuntu" panose="020B0504030602030204" charset="0"/>
+                <a:cs typeface="Ubuntu" panose="020B0504030602030204" charset="0"/>
+                <a:sym typeface="+mn-ea"/>
+              </a:rPr>
+              <a:t>Open Juypter Notebooks for session 05 to cover this topics in practice:</a:t>
+            </a:r>
+            <a:endParaRPr lang="en-US" altLang="ar-EG" sz="2400" dirty="0">
+              <a:latin typeface="Ubuntu" panose="020B0504030602030204" charset="0"/>
+              <a:cs typeface="Ubuntu" panose="020B0504030602030204" charset="0"/>
+            </a:endParaRPr>
+          </a:p>
+          <a:p>
+            <a:pPr algn="l"/>
+            <a:r>
+              <a:rPr lang="en-US" altLang="ar-EG" sz="2400" dirty="0">
+                <a:latin typeface="Ubuntu" panose="020B0504030602030204" charset="0"/>
+                <a:cs typeface="Ubuntu" panose="020B0504030602030204" charset="0"/>
+                <a:sym typeface="+mn-ea"/>
+              </a:rPr>
+              <a:t>Handle columns distribution</a:t>
+            </a:r>
+            <a:endParaRPr lang="en-US" altLang="ar-EG" sz="2400" dirty="0">
+              <a:latin typeface="Ubuntu" panose="020B0504030602030204" charset="0"/>
+              <a:cs typeface="Ubuntu" panose="020B0504030602030204" charset="0"/>
+              <a:sym typeface="+mn-ea"/>
+            </a:endParaRPr>
+          </a:p>
+          <a:p>
+            <a:pPr algn="l"/>
+            <a:r>
+              <a:rPr lang="en-US" altLang="ar-EG" sz="2400" dirty="0">
+                <a:latin typeface="Ubuntu" panose="020B0504030602030204" charset="0"/>
+                <a:cs typeface="Ubuntu" panose="020B0504030602030204" charset="0"/>
+                <a:sym typeface="+mn-ea"/>
+              </a:rPr>
+              <a:t>Check data formats, columns aggregation, units, scales, etc...</a:t>
+            </a:r>
+            <a:endParaRPr lang="en-US" altLang="ar-EG" sz="2400" dirty="0">
+              <a:latin typeface="Ubuntu" panose="020B0504030602030204" charset="0"/>
+              <a:cs typeface="Ubuntu" panose="020B0504030602030204" charset="0"/>
+              <a:sym typeface="+mn-ea"/>
+            </a:endParaRPr>
+          </a:p>
+          <a:p>
+            <a:pPr algn="l"/>
+            <a:r>
+              <a:rPr lang="en-US" altLang="ar-EG" sz="2400" dirty="0">
+                <a:latin typeface="Ubuntu" panose="020B0504030602030204" charset="0"/>
+                <a:cs typeface="Ubuntu" panose="020B0504030602030204" charset="0"/>
+                <a:sym typeface="+mn-ea"/>
+              </a:rPr>
+              <a:t>Data visualization using Seaborn.</a:t>
+            </a:r>
+            <a:endParaRPr lang="en-US" altLang="ar-EG" sz="2400" dirty="0">
+              <a:latin typeface="Ubuntu" panose="020B0504030602030204" charset="0"/>
+              <a:cs typeface="Ubuntu" panose="020B0504030602030204" charset="0"/>
+              <a:sym typeface="+mn-ea"/>
+            </a:endParaRPr>
+          </a:p>
+          <a:p>
+            <a:pPr algn="l"/>
+            <a:endParaRPr lang="en-US" altLang="ar-EG" sz="2400" dirty="0">
+              <a:latin typeface="Ubuntu" panose="020B0504030602030204" charset="0"/>
+              <a:cs typeface="Ubuntu" panose="020B0504030602030204" charset="0"/>
+            </a:endParaRPr>
+          </a:p>
+        </p:txBody>
+      </p:sp>
+    </p:spTree>
+  </p:cSld>
+  <p:clrMapOvr>
+    <a:masterClrMapping/>
+  </p:clrMapOvr>
+  <mc:AlternateContent xmlns:mc="http://schemas.openxmlformats.org/markup-compatibility/2006">
+    <mc:Choice xmlns:p14="http://schemas.microsoft.com/office/powerpoint/2010/main" Requires="p14">
+      <p:transition spd="slow" p14:dur="1200"/>
+    </mc:Choice>
+    <mc:Fallback>
+      <p:transition spd="slow"/>
+    </mc:Fallback>
+  </mc:AlternateContent>
+</p:sld>
+</file>
+
+<file path=ppt/slides/slide19.xml><?xml version="1.0" encoding="utf-8"?>
+<p:sld xmlns:a="http://schemas.openxmlformats.org/drawingml/2006/main" xmlns:r="http://schemas.openxmlformats.org/officeDocument/2006/relationships" xmlns:p="http://schemas.openxmlformats.org/presentationml/2006/main">
+  <p:cSld>
+    <p:spTree>
+      <p:nvGrpSpPr>
+        <p:cNvPr id="1" name=""/>
+        <p:cNvGrpSpPr/>
+        <p:nvPr/>
+      </p:nvGrpSpPr>
+      <p:grpSpPr>
+        <a:xfrm>
+          <a:off x="0" y="0"/>
+          <a:ext cx="0" cy="0"/>
+          <a:chOff x="0" y="0"/>
+          <a:chExt cx="0" cy="0"/>
+        </a:xfrm>
+      </p:grpSpPr>
+      <p:sp>
+        <p:nvSpPr>
+          <p:cNvPr id="2" name="Title 1"/>
+          <p:cNvSpPr>
+            <a:spLocks noGrp="1"/>
+          </p:cNvSpPr>
+          <p:nvPr>
+            <p:ph type="title"/>
+          </p:nvPr>
+        </p:nvSpPr>
+        <p:spPr/>
+        <p:txBody>
+          <a:bodyPr/>
+          <a:lstStyle/>
+          <a:p>
+            <a:pPr algn="l"/>
+            <a:r>
+              <a:rPr lang="en-US">
+                <a:latin typeface="Ubuntu" panose="020B0504030602030204" charset="0"/>
+                <a:cs typeface="Ubuntu" panose="020B0504030602030204" charset="0"/>
+              </a:rPr>
+              <a:t>References</a:t>
+            </a:r>
+            <a:endParaRPr lang="en-US">
+              <a:latin typeface="Ubuntu" panose="020B0504030602030204" charset="0"/>
+              <a:cs typeface="Ubuntu" panose="020B0504030602030204" charset="0"/>
+            </a:endParaRPr>
+          </a:p>
+        </p:txBody>
+      </p:sp>
+      <p:sp>
+        <p:nvSpPr>
+          <p:cNvPr id="3" name="Content Placeholder 2"/>
+          <p:cNvSpPr>
+            <a:spLocks noGrp="1"/>
+          </p:cNvSpPr>
+          <p:nvPr>
+            <p:ph idx="1"/>
+          </p:nvPr>
+        </p:nvSpPr>
+        <p:spPr/>
+        <p:txBody>
+          <a:bodyPr/>
+          <a:lstStyle/>
+          <a:p>
+            <a:pPr algn="l"/>
+            <a:r>
+              <a:rPr lang="en-US" sz="2400" dirty="0">
+                <a:latin typeface="Ubuntu" panose="020B0504030602030204" charset="0"/>
+                <a:cs typeface="Ubuntu" panose="020B0504030602030204" charset="0"/>
+                <a:hlinkClick r:id="rId1" tooltip="" action="ppaction://hlinkfile"/>
+              </a:rPr>
+              <a:t>https://towardsdatascience.com/having-an-imbalanced-dataset-here-is-how-you-can-solve-it-1640568947eb </a:t>
+            </a:r>
+            <a:endParaRPr lang="en-US" sz="2400" dirty="0">
+              <a:latin typeface="Ubuntu" panose="020B0504030602030204" charset="0"/>
+              <a:cs typeface="Ubuntu" panose="020B0504030602030204" charset="0"/>
+            </a:endParaRPr>
+          </a:p>
+        </p:txBody>
+      </p:sp>
+    </p:spTree>
+  </p:cSld>
+  <p:clrMapOvr>
+    <a:masterClrMapping/>
+  </p:clrMapOvr>
+</p:sld>
+</file>
+
 <file path=ppt/slides/slide2.xml><?xml version="1.0" encoding="utf-8"?>
 <p:sld xmlns:a="http://schemas.openxmlformats.org/drawingml/2006/main" xmlns:r="http://schemas.openxmlformats.org/officeDocument/2006/relationships" xmlns:p="http://schemas.openxmlformats.org/presentationml/2006/main">
   <p:cSld>
@@ -4229,6 +6705,64 @@
               <a:buFont typeface="+mj-lt"/>
               <a:buAutoNum type="arabicPeriod"/>
             </a:pPr>
+            <a:r>
+              <a:rPr lang="en-US" altLang="ar-EG" sz="2400" dirty="0">
+                <a:latin typeface="Ubuntu" panose="020B0504030602030204" charset="0"/>
+                <a:cs typeface="Ubuntu" panose="020B0504030602030204" charset="0"/>
+              </a:rPr>
+              <a:t>Handle Columns Distribution</a:t>
+            </a:r>
+            <a:endParaRPr lang="en-US" altLang="ar-EG" sz="2400" dirty="0">
+              <a:latin typeface="Ubuntu" panose="020B0504030602030204" charset="0"/>
+              <a:cs typeface="Ubuntu" panose="020B0504030602030204" charset="0"/>
+            </a:endParaRPr>
+          </a:p>
+          <a:p>
+            <a:pPr marL="457200" indent="-457200" algn="l">
+              <a:buFont typeface="+mj-lt"/>
+              <a:buAutoNum type="arabicPeriod"/>
+            </a:pPr>
+            <a:r>
+              <a:rPr lang="en-US" altLang="ar-EG" sz="2400" dirty="0">
+                <a:latin typeface="Ubuntu" panose="020B0504030602030204" charset="0"/>
+                <a:cs typeface="Ubuntu" panose="020B0504030602030204" charset="0"/>
+              </a:rPr>
+              <a:t>Data Unity</a:t>
+            </a:r>
+            <a:endParaRPr lang="en-US" altLang="ar-EG" sz="2400" dirty="0">
+              <a:latin typeface="Ubuntu" panose="020B0504030602030204" charset="0"/>
+              <a:cs typeface="Ubuntu" panose="020B0504030602030204" charset="0"/>
+            </a:endParaRPr>
+          </a:p>
+          <a:p>
+            <a:pPr marL="457200" indent="-457200" algn="l">
+              <a:buFont typeface="+mj-lt"/>
+              <a:buAutoNum type="arabicPeriod"/>
+            </a:pPr>
+            <a:r>
+              <a:rPr lang="en-US" altLang="ar-EG" sz="2400" dirty="0">
+                <a:latin typeface="Ubuntu" panose="020B0504030602030204" charset="0"/>
+                <a:cs typeface="Ubuntu" panose="020B0504030602030204" charset="0"/>
+              </a:rPr>
+              <a:t>Data Balancing</a:t>
+            </a:r>
+            <a:endParaRPr lang="en-US" altLang="ar-EG" sz="2400" dirty="0">
+              <a:latin typeface="Ubuntu" panose="020B0504030602030204" charset="0"/>
+              <a:cs typeface="Ubuntu" panose="020B0504030602030204" charset="0"/>
+            </a:endParaRPr>
+          </a:p>
+          <a:p>
+            <a:pPr marL="457200" indent="-457200" algn="l">
+              <a:buFont typeface="+mj-lt"/>
+              <a:buAutoNum type="arabicPeriod"/>
+            </a:pPr>
+            <a:r>
+              <a:rPr lang="en-US" altLang="ar-EG" sz="2400" dirty="0">
+                <a:latin typeface="Ubuntu" panose="020B0504030602030204" charset="0"/>
+                <a:cs typeface="Ubuntu" panose="020B0504030602030204" charset="0"/>
+              </a:rPr>
+              <a:t>Lab</a:t>
+            </a:r>
             <a:endParaRPr lang="en-US" altLang="ar-EG" sz="2400" dirty="0">
               <a:latin typeface="Ubuntu" panose="020B0504030602030204" charset="0"/>
               <a:cs typeface="Ubuntu" panose="020B0504030602030204" charset="0"/>
@@ -4249,6 +6783,126 @@
       <p:transition spd="slow"/>
     </mc:Fallback>
   </mc:AlternateContent>
+</p:sld>
+</file>
+
+<file path=ppt/slides/slide20.xml><?xml version="1.0" encoding="utf-8"?>
+<p:sld xmlns:a="http://schemas.openxmlformats.org/drawingml/2006/main" xmlns:r="http://schemas.openxmlformats.org/officeDocument/2006/relationships" xmlns:p="http://schemas.openxmlformats.org/presentationml/2006/main">
+  <p:cSld>
+    <p:spTree>
+      <p:nvGrpSpPr>
+        <p:cNvPr id="1" name=""/>
+        <p:cNvGrpSpPr/>
+        <p:nvPr/>
+      </p:nvGrpSpPr>
+      <p:grpSpPr>
+        <a:xfrm>
+          <a:off x="0" y="0"/>
+          <a:ext cx="0" cy="0"/>
+          <a:chOff x="0" y="0"/>
+          <a:chExt cx="0" cy="0"/>
+        </a:xfrm>
+      </p:grpSpPr>
+      <p:sp>
+        <p:nvSpPr>
+          <p:cNvPr id="2" name="Title 1"/>
+          <p:cNvSpPr>
+            <a:spLocks noGrp="1"/>
+          </p:cNvSpPr>
+          <p:nvPr>
+            <p:ph type="title"/>
+          </p:nvPr>
+        </p:nvSpPr>
+        <p:spPr>
+          <a:xfrm>
+            <a:off x="609600" y="1556385"/>
+            <a:ext cx="10972800" cy="1511935"/>
+          </a:xfrm>
+        </p:spPr>
+        <p:txBody>
+          <a:bodyPr/>
+          <a:lstStyle/>
+          <a:p>
+            <a:pPr algn="ctr">
+              <a:lnSpc>
+                <a:spcPct val="250000"/>
+              </a:lnSpc>
+            </a:pPr>
+            <a:r>
+              <a:rPr lang="en-US">
+                <a:latin typeface="Ubuntu" panose="020B0504030602030204" charset="0"/>
+                <a:cs typeface="Ubuntu" panose="020B0504030602030204" charset="0"/>
+              </a:rPr>
+              <a:t>Thanks</a:t>
+            </a:r>
+            <a:endParaRPr lang="en-US">
+              <a:latin typeface="Ubuntu" panose="020B0504030602030204" charset="0"/>
+              <a:cs typeface="Ubuntu" panose="020B0504030602030204" charset="0"/>
+            </a:endParaRPr>
+          </a:p>
+        </p:txBody>
+      </p:sp>
+      <p:sp>
+        <p:nvSpPr>
+          <p:cNvPr id="3" name="Content Placeholder 2"/>
+          <p:cNvSpPr>
+            <a:spLocks noGrp="1"/>
+          </p:cNvSpPr>
+          <p:nvPr>
+            <p:ph idx="1"/>
+          </p:nvPr>
+        </p:nvSpPr>
+        <p:spPr>
+          <a:xfrm>
+            <a:off x="609600" y="3178175"/>
+            <a:ext cx="10972800" cy="2948305"/>
+          </a:xfrm>
+        </p:spPr>
+        <p:txBody>
+          <a:bodyPr/>
+          <a:lstStyle/>
+          <a:p>
+            <a:pPr marL="0" indent="0" algn="ctr">
+              <a:buNone/>
+            </a:pPr>
+            <a:r>
+              <a:rPr lang="en-US" sz="2400">
+                <a:latin typeface="Ubuntu" panose="020B0504030602030204" charset="0"/>
+                <a:cs typeface="Ubuntu" panose="020B0504030602030204" charset="0"/>
+              </a:rPr>
+              <a:t>Please keep updated: </a:t>
+            </a:r>
+            <a:endParaRPr lang="en-US" sz="2400">
+              <a:latin typeface="Ubuntu" panose="020B0504030602030204" charset="0"/>
+              <a:cs typeface="Ubuntu" panose="020B0504030602030204" charset="0"/>
+            </a:endParaRPr>
+          </a:p>
+          <a:p>
+            <a:pPr marL="0" indent="0" algn="ctr">
+              <a:buNone/>
+            </a:pPr>
+            <a:r>
+              <a:rPr lang="en-US" sz="2400">
+                <a:latin typeface="Ubuntu" panose="020B0504030602030204" charset="0"/>
+                <a:cs typeface="Ubuntu" panose="020B0504030602030204" charset="0"/>
+                <a:sym typeface="+mn-ea"/>
+                <a:hlinkClick r:id="rId1" action="ppaction://hlinkfile"/>
+              </a:rPr>
+              <a:t>https://github.com/kershrita/IEEE-Data-Science</a:t>
+            </a:r>
+            <a:endParaRPr lang="en-US" sz="2400">
+              <a:latin typeface="Ubuntu" panose="020B0504030602030204" charset="0"/>
+              <a:cs typeface="Ubuntu" panose="020B0504030602030204" charset="0"/>
+              <a:sym typeface="+mn-ea"/>
+            </a:endParaRPr>
+          </a:p>
+        </p:txBody>
+      </p:sp>
+    </p:spTree>
+  </p:cSld>
+  <p:clrMapOvr>
+    <a:masterClrMapping/>
+  </p:clrMapOvr>
 </p:sld>
 </file>
 
@@ -4290,7 +6944,7 @@
                 <a:latin typeface="Ubuntu" panose="020B0504030602030204" charset="0"/>
                 <a:cs typeface="Ubuntu" panose="020B0504030602030204" charset="0"/>
               </a:rPr>
-              <a:t>References</a:t>
+              <a:t>Outline</a:t>
             </a:r>
             <a:endParaRPr lang="en-US">
               <a:latin typeface="Ubuntu" panose="020B0504030602030204" charset="0"/>
@@ -4314,8 +6968,99 @@
           <a:bodyPr/>
           <a:lstStyle/>
           <a:p>
-            <a:pPr algn="l"/>
-            <a:endParaRPr lang="en-US" sz="2400" dirty="0">
+            <a:pPr marL="457200" indent="-457200" algn="l">
+              <a:buFont typeface="+mj-lt"/>
+              <a:buAutoNum type="arabicPeriod"/>
+            </a:pPr>
+            <a:r>
+              <a:rPr lang="en-US" altLang="ar-EG" sz="2400" dirty="0">
+                <a:latin typeface="Ubuntu" panose="020B0504030602030204" charset="0"/>
+                <a:cs typeface="Ubuntu" panose="020B0504030602030204" charset="0"/>
+              </a:rPr>
+              <a:t>Handle Columns Distribution</a:t>
+            </a:r>
+            <a:endParaRPr lang="en-US" altLang="ar-EG" sz="2400" dirty="0">
+              <a:latin typeface="Ubuntu" panose="020B0504030602030204" charset="0"/>
+              <a:cs typeface="Ubuntu" panose="020B0504030602030204" charset="0"/>
+            </a:endParaRPr>
+          </a:p>
+          <a:p>
+            <a:pPr marL="457200" indent="-457200" algn="l">
+              <a:buFont typeface="+mj-lt"/>
+              <a:buAutoNum type="arabicPeriod"/>
+            </a:pPr>
+            <a:r>
+              <a:rPr lang="en-US" altLang="ar-EG" sz="2400" dirty="0">
+                <a:solidFill>
+                  <a:schemeClr val="accent3">
+                    <a:lumMod val="65000"/>
+                  </a:schemeClr>
+                </a:solidFill>
+                <a:latin typeface="Ubuntu" panose="020B0504030602030204" charset="0"/>
+                <a:cs typeface="Ubuntu" panose="020B0504030602030204" charset="0"/>
+              </a:rPr>
+              <a:t>Data Unity</a:t>
+            </a:r>
+            <a:endParaRPr lang="en-US" altLang="ar-EG" sz="2400" dirty="0">
+              <a:solidFill>
+                <a:schemeClr val="accent3">
+                  <a:lumMod val="65000"/>
+                </a:schemeClr>
+              </a:solidFill>
+              <a:latin typeface="Ubuntu" panose="020B0504030602030204" charset="0"/>
+              <a:cs typeface="Ubuntu" panose="020B0504030602030204" charset="0"/>
+            </a:endParaRPr>
+          </a:p>
+          <a:p>
+            <a:pPr marL="457200" indent="-457200" algn="l">
+              <a:buFont typeface="+mj-lt"/>
+              <a:buAutoNum type="arabicPeriod"/>
+            </a:pPr>
+            <a:r>
+              <a:rPr lang="en-US" altLang="ar-EG" sz="2400" dirty="0">
+                <a:solidFill>
+                  <a:schemeClr val="accent3">
+                    <a:lumMod val="65000"/>
+                  </a:schemeClr>
+                </a:solidFill>
+                <a:latin typeface="Ubuntu" panose="020B0504030602030204" charset="0"/>
+                <a:cs typeface="Ubuntu" panose="020B0504030602030204" charset="0"/>
+              </a:rPr>
+              <a:t>Data Balancing</a:t>
+            </a:r>
+            <a:endParaRPr lang="en-US" altLang="ar-EG" sz="2400" dirty="0">
+              <a:solidFill>
+                <a:schemeClr val="accent3">
+                  <a:lumMod val="65000"/>
+                </a:schemeClr>
+              </a:solidFill>
+              <a:latin typeface="Ubuntu" panose="020B0504030602030204" charset="0"/>
+              <a:cs typeface="Ubuntu" panose="020B0504030602030204" charset="0"/>
+            </a:endParaRPr>
+          </a:p>
+          <a:p>
+            <a:pPr marL="457200" indent="-457200" algn="l">
+              <a:buFont typeface="+mj-lt"/>
+              <a:buAutoNum type="arabicPeriod"/>
+            </a:pPr>
+            <a:r>
+              <a:rPr lang="en-US" altLang="ar-EG" sz="2400" dirty="0">
+                <a:solidFill>
+                  <a:schemeClr val="accent3">
+                    <a:lumMod val="65000"/>
+                  </a:schemeClr>
+                </a:solidFill>
+                <a:latin typeface="Ubuntu" panose="020B0504030602030204" charset="0"/>
+                <a:cs typeface="Ubuntu" panose="020B0504030602030204" charset="0"/>
+              </a:rPr>
+              <a:t>Lab</a:t>
+            </a:r>
+            <a:endParaRPr lang="en-US" altLang="ar-EG" sz="2400" dirty="0">
+              <a:solidFill>
+                <a:schemeClr val="accent3">
+                  <a:lumMod val="65000"/>
+                </a:schemeClr>
+              </a:solidFill>
               <a:latin typeface="Ubuntu" panose="020B0504030602030204" charset="0"/>
               <a:cs typeface="Ubuntu" panose="020B0504030602030204" charset="0"/>
             </a:endParaRPr>
@@ -4327,6 +7072,14 @@
   <p:clrMapOvr>
     <a:masterClrMapping/>
   </p:clrMapOvr>
+  <mc:AlternateContent xmlns:mc="http://schemas.openxmlformats.org/markup-compatibility/2006">
+    <mc:Choice xmlns:p14="http://schemas.microsoft.com/office/powerpoint/2010/main" Requires="p14">
+      <p:transition spd="slow" p14:dur="1200"/>
+    </mc:Choice>
+    <mc:Fallback>
+      <p:transition spd="slow"/>
+    </mc:Fallback>
+  </mc:AlternateContent>
 </p:sld>
 </file>
 
@@ -4357,27 +7110,18 @@
             <p:ph type="title"/>
           </p:nvPr>
         </p:nvSpPr>
-        <p:spPr>
-          <a:xfrm>
-            <a:off x="609600" y="1556385"/>
-            <a:ext cx="10972800" cy="1511935"/>
-          </a:xfrm>
-        </p:spPr>
-        <p:txBody>
-          <a:bodyPr/>
-          <a:lstStyle/>
-          <a:p>
-            <a:pPr algn="ctr">
-              <a:lnSpc>
-                <a:spcPct val="250000"/>
-              </a:lnSpc>
-            </a:pPr>
+        <p:spPr/>
+        <p:txBody>
+          <a:bodyPr/>
+          <a:lstStyle/>
+          <a:p>
+            <a:pPr algn="l"/>
             <a:r>
               <a:rPr lang="en-US">
                 <a:latin typeface="Ubuntu" panose="020B0504030602030204" charset="0"/>
                 <a:cs typeface="Ubuntu" panose="020B0504030602030204" charset="0"/>
               </a:rPr>
-              <a:t>Thanks</a:t>
+              <a:t>Handle Columns Distribution</a:t>
             </a:r>
             <a:endParaRPr lang="en-US">
               <a:latin typeface="Ubuntu" panose="020B0504030602030204" charset="0"/>
@@ -4396,48 +7140,87 @@
             <p:ph idx="1"/>
           </p:nvPr>
         </p:nvSpPr>
-        <p:spPr>
-          <a:xfrm>
-            <a:off x="609600" y="3178175"/>
-            <a:ext cx="10972800" cy="2948305"/>
-          </a:xfrm>
-        </p:spPr>
-        <p:txBody>
-          <a:bodyPr/>
-          <a:lstStyle/>
-          <a:p>
-            <a:pPr marL="0" indent="0" algn="ctr">
-              <a:buNone/>
+        <p:spPr/>
+        <p:txBody>
+          <a:bodyPr/>
+          <a:lstStyle/>
+          <a:p>
+            <a:pPr algn="l">
+              <a:buFont typeface="Arial" panose="02080604020202020204" pitchFamily="34" charset="0"/>
+              <a:buChar char="•"/>
             </a:pPr>
             <a:r>
-              <a:rPr lang="en-US" sz="2400">
+              <a:rPr lang="en-US" altLang="ar-EG" sz="2400" b="1" dirty="0">
                 <a:latin typeface="Ubuntu" panose="020B0504030602030204" charset="0"/>
                 <a:cs typeface="Ubuntu" panose="020B0504030602030204" charset="0"/>
               </a:rPr>
-              <a:t>Please keep updated: </a:t>
-            </a:r>
-            <a:endParaRPr lang="en-US" sz="2400">
+              <a:t>Explore Distributions:</a:t>
+            </a:r>
+            <a:r>
+              <a:rPr lang="en-US" altLang="ar-EG" sz="2400" dirty="0">
+                <a:latin typeface="Ubuntu" panose="020B0504030602030204" charset="0"/>
+                <a:cs typeface="Ubuntu" panose="020B0504030602030204" charset="0"/>
+              </a:rPr>
+              <a:t> Use visualizations (histograms, box plots, etc.) to understand the distribution of each column.</a:t>
+            </a:r>
+            <a:endParaRPr lang="en-US" altLang="ar-EG" sz="2400" dirty="0">
               <a:latin typeface="Ubuntu" panose="020B0504030602030204" charset="0"/>
               <a:cs typeface="Ubuntu" panose="020B0504030602030204" charset="0"/>
             </a:endParaRPr>
           </a:p>
           <a:p>
-            <a:pPr marL="0" indent="0" algn="ctr">
-              <a:buNone/>
+            <a:pPr algn="l">
+              <a:buFont typeface="Arial" panose="02080604020202020204" pitchFamily="34" charset="0"/>
+              <a:buChar char="•"/>
             </a:pPr>
             <a:r>
-              <a:rPr lang="en-US" sz="2400">
+              <a:rPr lang="en-US" altLang="ar-EG" sz="2400" b="1" dirty="0">
                 <a:latin typeface="Ubuntu" panose="020B0504030602030204" charset="0"/>
                 <a:cs typeface="Ubuntu" panose="020B0504030602030204" charset="0"/>
-                <a:sym typeface="+mn-ea"/>
-                <a:hlinkClick r:id="rId1" action="ppaction://hlinkfile"/>
               </a:rPr>
-              <a:t>https://github.com/kershrita/IEEE-Data-Science</a:t>
-            </a:r>
-            <a:endParaRPr lang="en-US" sz="2400">
+              <a:t>Dealing with Skewness: </a:t>
+            </a:r>
+            <a:r>
+              <a:rPr lang="en-US" altLang="ar-EG" sz="2400" dirty="0">
+                <a:latin typeface="Ubuntu" panose="020B0504030602030204" charset="0"/>
+                <a:cs typeface="Ubuntu" panose="020B0504030602030204" charset="0"/>
+              </a:rPr>
+              <a:t> H</a:t>
+            </a:r>
+            <a:r>
+              <a:rPr lang="en-US" altLang="ar-EG" sz="2400" dirty="0">
+                <a:latin typeface="Ubuntu" panose="020B0504030602030204" charset="0"/>
+                <a:cs typeface="Ubuntu" panose="020B0504030602030204" charset="0"/>
+              </a:rPr>
+              <a:t>andle skewed distributions, such as log transformations or power transformations, etc ...</a:t>
+            </a:r>
+            <a:endParaRPr lang="en-US" altLang="ar-EG" sz="2400" dirty="0">
               <a:latin typeface="Ubuntu" panose="020B0504030602030204" charset="0"/>
               <a:cs typeface="Ubuntu" panose="020B0504030602030204" charset="0"/>
-              <a:sym typeface="+mn-ea"/>
+            </a:endParaRPr>
+          </a:p>
+          <a:p>
+            <a:pPr algn="l">
+              <a:buFont typeface="Arial" panose="02080604020202020204" pitchFamily="34" charset="0"/>
+              <a:buChar char="•"/>
+            </a:pPr>
+            <a:r>
+              <a:rPr lang="en-US" altLang="ar-EG" sz="2400" b="1" dirty="0">
+                <a:latin typeface="Ubuntu" panose="020B0504030602030204" charset="0"/>
+                <a:cs typeface="Ubuntu" panose="020B0504030602030204" charset="0"/>
+              </a:rPr>
+              <a:t>Outlier Detection and Treatment: </a:t>
+            </a:r>
+            <a:r>
+              <a:rPr lang="en-US" altLang="ar-EG" sz="2400" dirty="0">
+                <a:latin typeface="Ubuntu" panose="020B0504030602030204" charset="0"/>
+                <a:cs typeface="Ubuntu" panose="020B0504030602030204" charset="0"/>
+              </a:rPr>
+              <a:t>Identify and handle outliers that might affect the distribution.</a:t>
+            </a:r>
+            <a:endParaRPr lang="en-US" altLang="ar-EG" sz="2400" dirty="0">
+              <a:latin typeface="Ubuntu" panose="020B0504030602030204" charset="0"/>
+              <a:cs typeface="Ubuntu" panose="020B0504030602030204" charset="0"/>
             </a:endParaRPr>
           </a:p>
         </p:txBody>
@@ -4447,6 +7230,937 @@
   <p:clrMapOvr>
     <a:masterClrMapping/>
   </p:clrMapOvr>
+  <mc:AlternateContent xmlns:mc="http://schemas.openxmlformats.org/markup-compatibility/2006">
+    <mc:Choice xmlns:p14="http://schemas.microsoft.com/office/powerpoint/2010/main" Requires="p14">
+      <p:transition spd="slow" p14:dur="1200"/>
+    </mc:Choice>
+    <mc:Fallback>
+      <p:transition spd="slow"/>
+    </mc:Fallback>
+  </mc:AlternateContent>
+</p:sld>
+</file>
+
+<file path=ppt/slides/slide5.xml><?xml version="1.0" encoding="utf-8"?>
+<p:sld xmlns:a="http://schemas.openxmlformats.org/drawingml/2006/main" xmlns:r="http://schemas.openxmlformats.org/officeDocument/2006/relationships" xmlns:p="http://schemas.openxmlformats.org/presentationml/2006/main">
+  <p:cSld>
+    <p:spTree>
+      <p:nvGrpSpPr>
+        <p:cNvPr id="1" name=""/>
+        <p:cNvGrpSpPr/>
+        <p:nvPr/>
+      </p:nvGrpSpPr>
+      <p:grpSpPr>
+        <a:xfrm>
+          <a:off x="0" y="0"/>
+          <a:ext cx="0" cy="0"/>
+          <a:chOff x="0" y="0"/>
+          <a:chExt cx="0" cy="0"/>
+        </a:xfrm>
+      </p:grpSpPr>
+      <p:sp>
+        <p:nvSpPr>
+          <p:cNvPr id="2" name="Title 1"/>
+          <p:cNvSpPr>
+            <a:spLocks noGrp="1"/>
+          </p:cNvSpPr>
+          <p:nvPr>
+            <p:ph type="title"/>
+          </p:nvPr>
+        </p:nvSpPr>
+        <p:spPr/>
+        <p:txBody>
+          <a:bodyPr/>
+          <a:lstStyle/>
+          <a:p>
+            <a:pPr algn="l"/>
+            <a:r>
+              <a:rPr lang="en-US">
+                <a:latin typeface="Ubuntu" panose="020B0504030602030204" charset="0"/>
+                <a:cs typeface="Ubuntu" panose="020B0504030602030204" charset="0"/>
+              </a:rPr>
+              <a:t>Handle Columns Distribution (cont)</a:t>
+            </a:r>
+            <a:endParaRPr lang="en-US">
+              <a:latin typeface="Ubuntu" panose="020B0504030602030204" charset="0"/>
+              <a:cs typeface="Ubuntu" panose="020B0504030602030204" charset="0"/>
+            </a:endParaRPr>
+          </a:p>
+        </p:txBody>
+      </p:sp>
+      <p:sp>
+        <p:nvSpPr>
+          <p:cNvPr id="3" name="Content Placeholder 2"/>
+          <p:cNvSpPr>
+            <a:spLocks noGrp="1"/>
+          </p:cNvSpPr>
+          <p:nvPr>
+            <p:ph idx="1"/>
+          </p:nvPr>
+        </p:nvSpPr>
+        <p:spPr/>
+        <p:txBody>
+          <a:bodyPr/>
+          <a:lstStyle/>
+          <a:p>
+            <a:pPr algn="l">
+              <a:buFont typeface="Arial" panose="02080604020202020204" pitchFamily="34" charset="0"/>
+              <a:buChar char="•"/>
+            </a:pPr>
+            <a:endParaRPr lang="en-US" altLang="ar-EG" sz="2400" dirty="0">
+              <a:latin typeface="Ubuntu" panose="020B0504030602030204" charset="0"/>
+              <a:cs typeface="Ubuntu" panose="020B0504030602030204" charset="0"/>
+            </a:endParaRPr>
+          </a:p>
+        </p:txBody>
+      </p:sp>
+      <p:pic>
+        <p:nvPicPr>
+          <p:cNvPr id="6" name="Picture 5" descr="A screenshot of a graph&#10;&#10;Description automatically generated"/>
+          <p:cNvPicPr>
+            <a:picLocks noChangeAspect="1"/>
+          </p:cNvPicPr>
+          <p:nvPr/>
+        </p:nvPicPr>
+        <p:blipFill rotWithShape="1">
+          <a:blip r:embed="rId1"/>
+          <a:srcRect l="50000" t="40139" r="24861" b="40277"/>
+          <a:stretch>
+            <a:fillRect/>
+          </a:stretch>
+        </p:blipFill>
+        <p:spPr>
+          <a:xfrm>
+            <a:off x="7124700" y="2490761"/>
+            <a:ext cx="4265435" cy="3322800"/>
+          </a:xfrm>
+          <a:prstGeom prst="rect">
+            <a:avLst/>
+          </a:prstGeom>
+        </p:spPr>
+      </p:pic>
+      <p:sp>
+        <p:nvSpPr>
+          <p:cNvPr id="7" name="Arrow: Right 4"/>
+          <p:cNvSpPr/>
+          <p:nvPr/>
+        </p:nvSpPr>
+        <p:spPr>
+          <a:xfrm>
+            <a:off x="4743450" y="3537530"/>
+            <a:ext cx="2266950" cy="1229263"/>
+          </a:xfrm>
+          <a:prstGeom prst="rightArrow">
+            <a:avLst/>
+          </a:prstGeom>
+        </p:spPr>
+        <p:style>
+          <a:lnRef idx="2">
+            <a:schemeClr val="accent1">
+              <a:shade val="15000"/>
+            </a:schemeClr>
+          </a:lnRef>
+          <a:fillRef idx="1">
+            <a:schemeClr val="accent1"/>
+          </a:fillRef>
+          <a:effectRef idx="0">
+            <a:schemeClr val="accent1"/>
+          </a:effectRef>
+          <a:fontRef idx="minor">
+            <a:schemeClr val="lt1"/>
+          </a:fontRef>
+        </p:style>
+        <p:txBody>
+          <a:bodyPr lIns="91440" tIns="45720" rIns="91440" bIns="45720" rtlCol="0" anchor="ctr"/>
+          <a:lstStyle/>
+          <a:p>
+            <a:pPr algn="ctr"/>
+            <a:r>
+              <a:rPr lang="en-US" sz="2400" dirty="0">
+                <a:cs typeface="Calibri"/>
+              </a:rPr>
+              <a:t>LOG</a:t>
+            </a:r>
+            <a:endParaRPr lang="en-US" sz="2400" dirty="0"/>
+          </a:p>
+        </p:txBody>
+      </p:sp>
+      <p:pic>
+        <p:nvPicPr>
+          <p:cNvPr id="9" name="Picture 8" descr="A screenshot of a graph&#10;&#10;Description automatically generated"/>
+          <p:cNvPicPr>
+            <a:picLocks noChangeAspect="1"/>
+          </p:cNvPicPr>
+          <p:nvPr/>
+        </p:nvPicPr>
+        <p:blipFill rotWithShape="1">
+          <a:blip r:embed="rId2"/>
+          <a:srcRect l="50063" t="39922" r="25188" b="40141"/>
+          <a:stretch>
+            <a:fillRect/>
+          </a:stretch>
+        </p:blipFill>
+        <p:spPr>
+          <a:xfrm>
+            <a:off x="478015" y="2490761"/>
+            <a:ext cx="4050030" cy="3262508"/>
+          </a:xfrm>
+          <a:prstGeom prst="rect">
+            <a:avLst/>
+          </a:prstGeom>
+        </p:spPr>
+      </p:pic>
+    </p:spTree>
+  </p:cSld>
+  <p:clrMapOvr>
+    <a:masterClrMapping/>
+  </p:clrMapOvr>
+  <mc:AlternateContent xmlns:mc="http://schemas.openxmlformats.org/markup-compatibility/2006">
+    <mc:Choice xmlns:p14="http://schemas.microsoft.com/office/powerpoint/2010/main" Requires="p14">
+      <p:transition spd="slow" p14:dur="1200"/>
+    </mc:Choice>
+    <mc:Fallback>
+      <p:transition spd="slow"/>
+    </mc:Fallback>
+  </mc:AlternateContent>
+</p:sld>
+</file>
+
+<file path=ppt/slides/slide6.xml><?xml version="1.0" encoding="utf-8"?>
+<p:sld xmlns:a="http://schemas.openxmlformats.org/drawingml/2006/main" xmlns:r="http://schemas.openxmlformats.org/officeDocument/2006/relationships" xmlns:p="http://schemas.openxmlformats.org/presentationml/2006/main">
+  <p:cSld>
+    <p:spTree>
+      <p:nvGrpSpPr>
+        <p:cNvPr id="1" name=""/>
+        <p:cNvGrpSpPr/>
+        <p:nvPr/>
+      </p:nvGrpSpPr>
+      <p:grpSpPr>
+        <a:xfrm>
+          <a:off x="0" y="0"/>
+          <a:ext cx="0" cy="0"/>
+          <a:chOff x="0" y="0"/>
+          <a:chExt cx="0" cy="0"/>
+        </a:xfrm>
+      </p:grpSpPr>
+      <p:sp>
+        <p:nvSpPr>
+          <p:cNvPr id="2" name="Title 1"/>
+          <p:cNvSpPr>
+            <a:spLocks noGrp="1"/>
+          </p:cNvSpPr>
+          <p:nvPr>
+            <p:ph type="title"/>
+          </p:nvPr>
+        </p:nvSpPr>
+        <p:spPr/>
+        <p:txBody>
+          <a:bodyPr/>
+          <a:lstStyle/>
+          <a:p>
+            <a:pPr algn="l"/>
+            <a:r>
+              <a:rPr lang="en-US">
+                <a:latin typeface="Ubuntu" panose="020B0504030602030204" charset="0"/>
+                <a:cs typeface="Ubuntu" panose="020B0504030602030204" charset="0"/>
+              </a:rPr>
+              <a:t>Handle Columns Distribution (cont)</a:t>
+            </a:r>
+            <a:endParaRPr lang="en-US">
+              <a:latin typeface="Ubuntu" panose="020B0504030602030204" charset="0"/>
+              <a:cs typeface="Ubuntu" panose="020B0504030602030204" charset="0"/>
+            </a:endParaRPr>
+          </a:p>
+        </p:txBody>
+      </p:sp>
+      <p:sp>
+        <p:nvSpPr>
+          <p:cNvPr id="3" name="Content Placeholder 2"/>
+          <p:cNvSpPr>
+            <a:spLocks noGrp="1"/>
+          </p:cNvSpPr>
+          <p:nvPr>
+            <p:ph idx="1"/>
+          </p:nvPr>
+        </p:nvSpPr>
+        <p:spPr/>
+        <p:txBody>
+          <a:bodyPr/>
+          <a:lstStyle/>
+          <a:p>
+            <a:pPr algn="l">
+              <a:buFont typeface="Arial" panose="02080604020202020204" pitchFamily="34" charset="0"/>
+              <a:buChar char="•"/>
+            </a:pPr>
+            <a:endParaRPr lang="en-US" altLang="ar-EG" sz="2400" dirty="0">
+              <a:latin typeface="Ubuntu" panose="020B0504030602030204" charset="0"/>
+              <a:cs typeface="Ubuntu" panose="020B0504030602030204" charset="0"/>
+            </a:endParaRPr>
+          </a:p>
+        </p:txBody>
+      </p:sp>
+      <p:pic>
+        <p:nvPicPr>
+          <p:cNvPr id="4" name="Picture 3" descr="A screenshot of a graph&#10;&#10;Description automatically generated"/>
+          <p:cNvPicPr>
+            <a:picLocks noChangeAspect="1"/>
+          </p:cNvPicPr>
+          <p:nvPr/>
+        </p:nvPicPr>
+        <p:blipFill rotWithShape="1">
+          <a:blip r:embed="rId1"/>
+          <a:srcRect l="24738" t="59797" r="50123" b="20619"/>
+          <a:stretch>
+            <a:fillRect/>
+          </a:stretch>
+        </p:blipFill>
+        <p:spPr>
+          <a:xfrm>
+            <a:off x="7124700" y="2490761"/>
+            <a:ext cx="4265435" cy="3322800"/>
+          </a:xfrm>
+          <a:prstGeom prst="rect">
+            <a:avLst/>
+          </a:prstGeom>
+        </p:spPr>
+      </p:pic>
+      <p:sp>
+        <p:nvSpPr>
+          <p:cNvPr id="5" name="Arrow: Right 4"/>
+          <p:cNvSpPr/>
+          <p:nvPr/>
+        </p:nvSpPr>
+        <p:spPr>
+          <a:xfrm>
+            <a:off x="4743450" y="3537530"/>
+            <a:ext cx="2266950" cy="1229263"/>
+          </a:xfrm>
+          <a:prstGeom prst="rightArrow">
+            <a:avLst/>
+          </a:prstGeom>
+        </p:spPr>
+        <p:style>
+          <a:lnRef idx="2">
+            <a:schemeClr val="accent1">
+              <a:shade val="15000"/>
+            </a:schemeClr>
+          </a:lnRef>
+          <a:fillRef idx="1">
+            <a:schemeClr val="accent1"/>
+          </a:fillRef>
+          <a:effectRef idx="0">
+            <a:schemeClr val="accent1"/>
+          </a:effectRef>
+          <a:fontRef idx="minor">
+            <a:schemeClr val="lt1"/>
+          </a:fontRef>
+        </p:style>
+        <p:txBody>
+          <a:bodyPr lIns="91440" tIns="45720" rIns="91440" bIns="45720" rtlCol="0" anchor="ctr"/>
+          <a:p>
+            <a:pPr algn="ctr"/>
+            <a:r>
+              <a:rPr lang="en-US" sz="2400" dirty="0">
+                <a:cs typeface="Calibri"/>
+              </a:rPr>
+              <a:t>SQRT</a:t>
+            </a:r>
+            <a:endParaRPr lang="en-US" sz="2400" dirty="0"/>
+          </a:p>
+        </p:txBody>
+      </p:sp>
+      <p:pic>
+        <p:nvPicPr>
+          <p:cNvPr id="8" name="Picture 7" descr="A screenshot of a graph&#10;&#10;Description automatically generated"/>
+          <p:cNvPicPr>
+            <a:picLocks noChangeAspect="1"/>
+          </p:cNvPicPr>
+          <p:nvPr/>
+        </p:nvPicPr>
+        <p:blipFill rotWithShape="1">
+          <a:blip r:embed="rId2"/>
+          <a:srcRect l="25035" t="60158" r="50216" b="19905"/>
+          <a:stretch>
+            <a:fillRect/>
+          </a:stretch>
+        </p:blipFill>
+        <p:spPr>
+          <a:xfrm>
+            <a:off x="478015" y="2490761"/>
+            <a:ext cx="4050030" cy="3262508"/>
+          </a:xfrm>
+          <a:prstGeom prst="rect">
+            <a:avLst/>
+          </a:prstGeom>
+        </p:spPr>
+      </p:pic>
+    </p:spTree>
+  </p:cSld>
+  <p:clrMapOvr>
+    <a:masterClrMapping/>
+  </p:clrMapOvr>
+  <mc:AlternateContent xmlns:mc="http://schemas.openxmlformats.org/markup-compatibility/2006">
+    <mc:Choice xmlns:p14="http://schemas.microsoft.com/office/powerpoint/2010/main" Requires="p14">
+      <p:transition spd="slow" p14:dur="1200"/>
+    </mc:Choice>
+    <mc:Fallback>
+      <p:transition spd="slow"/>
+    </mc:Fallback>
+  </mc:AlternateContent>
+</p:sld>
+</file>
+
+<file path=ppt/slides/slide7.xml><?xml version="1.0" encoding="utf-8"?>
+<p:sld xmlns:a="http://schemas.openxmlformats.org/drawingml/2006/main" xmlns:r="http://schemas.openxmlformats.org/officeDocument/2006/relationships" xmlns:p="http://schemas.openxmlformats.org/presentationml/2006/main">
+  <p:cSld>
+    <p:spTree>
+      <p:nvGrpSpPr>
+        <p:cNvPr id="1" name=""/>
+        <p:cNvGrpSpPr/>
+        <p:nvPr/>
+      </p:nvGrpSpPr>
+      <p:grpSpPr>
+        <a:xfrm>
+          <a:off x="0" y="0"/>
+          <a:ext cx="0" cy="0"/>
+          <a:chOff x="0" y="0"/>
+          <a:chExt cx="0" cy="0"/>
+        </a:xfrm>
+      </p:grpSpPr>
+      <p:sp>
+        <p:nvSpPr>
+          <p:cNvPr id="2" name="Title 1"/>
+          <p:cNvSpPr>
+            <a:spLocks noGrp="1"/>
+          </p:cNvSpPr>
+          <p:nvPr>
+            <p:ph type="title"/>
+          </p:nvPr>
+        </p:nvSpPr>
+        <p:spPr/>
+        <p:txBody>
+          <a:bodyPr/>
+          <a:lstStyle/>
+          <a:p>
+            <a:pPr algn="l"/>
+            <a:r>
+              <a:rPr lang="en-US">
+                <a:latin typeface="Ubuntu" panose="020B0504030602030204" charset="0"/>
+                <a:cs typeface="Ubuntu" panose="020B0504030602030204" charset="0"/>
+              </a:rPr>
+              <a:t>Handle Columns Distribution (cont)</a:t>
+            </a:r>
+            <a:endParaRPr lang="en-US">
+              <a:latin typeface="Ubuntu" panose="020B0504030602030204" charset="0"/>
+              <a:cs typeface="Ubuntu" panose="020B0504030602030204" charset="0"/>
+            </a:endParaRPr>
+          </a:p>
+        </p:txBody>
+      </p:sp>
+      <p:sp>
+        <p:nvSpPr>
+          <p:cNvPr id="3" name="Content Placeholder 2"/>
+          <p:cNvSpPr>
+            <a:spLocks noGrp="1"/>
+          </p:cNvSpPr>
+          <p:nvPr>
+            <p:ph idx="1"/>
+          </p:nvPr>
+        </p:nvSpPr>
+        <p:spPr/>
+        <p:txBody>
+          <a:bodyPr/>
+          <a:lstStyle/>
+          <a:p>
+            <a:pPr algn="l">
+              <a:buFont typeface="Arial" panose="02080604020202020204" pitchFamily="34" charset="0"/>
+              <a:buChar char="•"/>
+            </a:pPr>
+            <a:endParaRPr lang="en-US" altLang="ar-EG" sz="2400" dirty="0">
+              <a:latin typeface="Ubuntu" panose="020B0504030602030204" charset="0"/>
+              <a:cs typeface="Ubuntu" panose="020B0504030602030204" charset="0"/>
+            </a:endParaRPr>
+          </a:p>
+        </p:txBody>
+      </p:sp>
+      <p:pic>
+        <p:nvPicPr>
+          <p:cNvPr id="4" name="Picture 3" descr="A screenshot of a graph&#10;&#10;Description automatically generated"/>
+          <p:cNvPicPr>
+            <a:picLocks noChangeAspect="1"/>
+          </p:cNvPicPr>
+          <p:nvPr/>
+        </p:nvPicPr>
+        <p:blipFill rotWithShape="1">
+          <a:blip r:embed="rId1"/>
+          <a:srcRect l="24963" t="20378" r="49898" b="60038"/>
+          <a:stretch>
+            <a:fillRect/>
+          </a:stretch>
+        </p:blipFill>
+        <p:spPr>
+          <a:xfrm>
+            <a:off x="7124700" y="2490761"/>
+            <a:ext cx="4265435" cy="3322800"/>
+          </a:xfrm>
+          <a:prstGeom prst="rect">
+            <a:avLst/>
+          </a:prstGeom>
+        </p:spPr>
+      </p:pic>
+      <p:sp>
+        <p:nvSpPr>
+          <p:cNvPr id="5" name="Arrow: Right 4"/>
+          <p:cNvSpPr/>
+          <p:nvPr/>
+        </p:nvSpPr>
+        <p:spPr>
+          <a:xfrm>
+            <a:off x="4743450" y="3537530"/>
+            <a:ext cx="2266950" cy="1229263"/>
+          </a:xfrm>
+          <a:prstGeom prst="rightArrow">
+            <a:avLst/>
+          </a:prstGeom>
+        </p:spPr>
+        <p:style>
+          <a:lnRef idx="2">
+            <a:schemeClr val="accent1">
+              <a:shade val="15000"/>
+            </a:schemeClr>
+          </a:lnRef>
+          <a:fillRef idx="1">
+            <a:schemeClr val="accent1"/>
+          </a:fillRef>
+          <a:effectRef idx="0">
+            <a:schemeClr val="accent1"/>
+          </a:effectRef>
+          <a:fontRef idx="minor">
+            <a:schemeClr val="lt1"/>
+          </a:fontRef>
+        </p:style>
+        <p:txBody>
+          <a:bodyPr lIns="91440" tIns="45720" rIns="91440" bIns="45720" rtlCol="0" anchor="ctr"/>
+          <a:p>
+            <a:pPr algn="ctr"/>
+            <a:r>
+              <a:rPr lang="en-US" sz="2400" dirty="0">
+                <a:cs typeface="Calibri"/>
+              </a:rPr>
+              <a:t>CBRT</a:t>
+            </a:r>
+            <a:endParaRPr lang="en-US" sz="2400" dirty="0"/>
+          </a:p>
+        </p:txBody>
+      </p:sp>
+      <p:pic>
+        <p:nvPicPr>
+          <p:cNvPr id="8" name="Picture 7" descr="A screenshot of a graph&#10;&#10;Description automatically generated"/>
+          <p:cNvPicPr>
+            <a:picLocks noChangeAspect="1"/>
+          </p:cNvPicPr>
+          <p:nvPr/>
+        </p:nvPicPr>
+        <p:blipFill rotWithShape="1">
+          <a:blip r:embed="rId2"/>
+          <a:srcRect l="24918" t="20481" r="50333" b="59582"/>
+          <a:stretch>
+            <a:fillRect/>
+          </a:stretch>
+        </p:blipFill>
+        <p:spPr>
+          <a:xfrm>
+            <a:off x="478015" y="2490761"/>
+            <a:ext cx="4050030" cy="3262508"/>
+          </a:xfrm>
+          <a:prstGeom prst="rect">
+            <a:avLst/>
+          </a:prstGeom>
+        </p:spPr>
+      </p:pic>
+    </p:spTree>
+  </p:cSld>
+  <p:clrMapOvr>
+    <a:masterClrMapping/>
+  </p:clrMapOvr>
+  <mc:AlternateContent xmlns:mc="http://schemas.openxmlformats.org/markup-compatibility/2006">
+    <mc:Choice xmlns:p14="http://schemas.microsoft.com/office/powerpoint/2010/main" Requires="p14">
+      <p:transition spd="slow" p14:dur="1200"/>
+    </mc:Choice>
+    <mc:Fallback>
+      <p:transition spd="slow"/>
+    </mc:Fallback>
+  </mc:AlternateContent>
+</p:sld>
+</file>
+
+<file path=ppt/slides/slide8.xml><?xml version="1.0" encoding="utf-8"?>
+<p:sld xmlns:a="http://schemas.openxmlformats.org/drawingml/2006/main" xmlns:r="http://schemas.openxmlformats.org/officeDocument/2006/relationships" xmlns:p="http://schemas.openxmlformats.org/presentationml/2006/main">
+  <p:cSld>
+    <p:spTree>
+      <p:nvGrpSpPr>
+        <p:cNvPr id="1" name=""/>
+        <p:cNvGrpSpPr/>
+        <p:nvPr/>
+      </p:nvGrpSpPr>
+      <p:grpSpPr>
+        <a:xfrm>
+          <a:off x="0" y="0"/>
+          <a:ext cx="0" cy="0"/>
+          <a:chOff x="0" y="0"/>
+          <a:chExt cx="0" cy="0"/>
+        </a:xfrm>
+      </p:grpSpPr>
+      <p:sp>
+        <p:nvSpPr>
+          <p:cNvPr id="2" name="Title 1"/>
+          <p:cNvSpPr>
+            <a:spLocks noGrp="1"/>
+          </p:cNvSpPr>
+          <p:nvPr>
+            <p:ph type="title"/>
+          </p:nvPr>
+        </p:nvSpPr>
+        <p:spPr/>
+        <p:txBody>
+          <a:bodyPr/>
+          <a:lstStyle/>
+          <a:p>
+            <a:pPr algn="l"/>
+            <a:r>
+              <a:rPr lang="en-US">
+                <a:latin typeface="Ubuntu" panose="020B0504030602030204" charset="0"/>
+                <a:cs typeface="Ubuntu" panose="020B0504030602030204" charset="0"/>
+              </a:rPr>
+              <a:t>Handle Columns Distribution (cont)</a:t>
+            </a:r>
+            <a:endParaRPr lang="en-US">
+              <a:latin typeface="Ubuntu" panose="020B0504030602030204" charset="0"/>
+              <a:cs typeface="Ubuntu" panose="020B0504030602030204" charset="0"/>
+            </a:endParaRPr>
+          </a:p>
+        </p:txBody>
+      </p:sp>
+      <p:sp>
+        <p:nvSpPr>
+          <p:cNvPr id="3" name="Content Placeholder 2"/>
+          <p:cNvSpPr>
+            <a:spLocks noGrp="1"/>
+          </p:cNvSpPr>
+          <p:nvPr>
+            <p:ph idx="1"/>
+          </p:nvPr>
+        </p:nvSpPr>
+        <p:spPr/>
+        <p:txBody>
+          <a:bodyPr/>
+          <a:lstStyle/>
+          <a:p>
+            <a:pPr algn="l">
+              <a:buFont typeface="Arial" panose="02080604020202020204" pitchFamily="34" charset="0"/>
+              <a:buChar char="•"/>
+            </a:pPr>
+            <a:endParaRPr lang="en-US" altLang="ar-EG" sz="2400" dirty="0">
+              <a:latin typeface="Ubuntu" panose="020B0504030602030204" charset="0"/>
+              <a:cs typeface="Ubuntu" panose="020B0504030602030204" charset="0"/>
+            </a:endParaRPr>
+          </a:p>
+        </p:txBody>
+      </p:sp>
+      <p:pic>
+        <p:nvPicPr>
+          <p:cNvPr id="6" name="Picture 5" descr="A screenshot of a graph&#10;&#10;Description automatically generated"/>
+          <p:cNvPicPr>
+            <a:picLocks noChangeAspect="1"/>
+          </p:cNvPicPr>
+          <p:nvPr/>
+        </p:nvPicPr>
+        <p:blipFill rotWithShape="1">
+          <a:blip r:embed="rId1"/>
+          <a:srcRect l="24963" t="20378" r="49898" b="60038"/>
+          <a:stretch>
+            <a:fillRect/>
+          </a:stretch>
+        </p:blipFill>
+        <p:spPr>
+          <a:xfrm>
+            <a:off x="7124700" y="2490761"/>
+            <a:ext cx="4265435" cy="3322800"/>
+          </a:xfrm>
+          <a:prstGeom prst="rect">
+            <a:avLst/>
+          </a:prstGeom>
+        </p:spPr>
+      </p:pic>
+      <p:sp>
+        <p:nvSpPr>
+          <p:cNvPr id="7" name="Arrow: Right 4"/>
+          <p:cNvSpPr/>
+          <p:nvPr/>
+        </p:nvSpPr>
+        <p:spPr>
+          <a:xfrm>
+            <a:off x="4743450" y="3537530"/>
+            <a:ext cx="2266950" cy="1229263"/>
+          </a:xfrm>
+          <a:prstGeom prst="rightArrow">
+            <a:avLst/>
+          </a:prstGeom>
+        </p:spPr>
+        <p:style>
+          <a:lnRef idx="2">
+            <a:schemeClr val="accent1">
+              <a:shade val="15000"/>
+            </a:schemeClr>
+          </a:lnRef>
+          <a:fillRef idx="1">
+            <a:schemeClr val="accent1"/>
+          </a:fillRef>
+          <a:effectRef idx="0">
+            <a:schemeClr val="accent1"/>
+          </a:effectRef>
+          <a:fontRef idx="minor">
+            <a:schemeClr val="lt1"/>
+          </a:fontRef>
+        </p:style>
+        <p:txBody>
+          <a:bodyPr lIns="91440" tIns="45720" rIns="91440" bIns="45720" rtlCol="0" anchor="ctr"/>
+          <a:lstStyle/>
+          <a:p>
+            <a:pPr algn="ctr"/>
+            <a:r>
+              <a:rPr lang="en-US" sz="2400" dirty="0">
+                <a:cs typeface="Calibri"/>
+              </a:rPr>
+              <a:t>CBRT</a:t>
+            </a:r>
+            <a:endParaRPr lang="en-US" sz="2400" dirty="0"/>
+          </a:p>
+        </p:txBody>
+      </p:sp>
+      <p:pic>
+        <p:nvPicPr>
+          <p:cNvPr id="9" name="Picture 8" descr="A screenshot of a graph&#10;&#10;Description automatically generated"/>
+          <p:cNvPicPr>
+            <a:picLocks noChangeAspect="1"/>
+          </p:cNvPicPr>
+          <p:nvPr/>
+        </p:nvPicPr>
+        <p:blipFill rotWithShape="1">
+          <a:blip r:embed="rId2"/>
+          <a:srcRect l="24918" t="20481" r="50333" b="59582"/>
+          <a:stretch>
+            <a:fillRect/>
+          </a:stretch>
+        </p:blipFill>
+        <p:spPr>
+          <a:xfrm>
+            <a:off x="478015" y="2490761"/>
+            <a:ext cx="4050030" cy="3262508"/>
+          </a:xfrm>
+          <a:prstGeom prst="rect">
+            <a:avLst/>
+          </a:prstGeom>
+        </p:spPr>
+      </p:pic>
+    </p:spTree>
+  </p:cSld>
+  <p:clrMapOvr>
+    <a:masterClrMapping/>
+  </p:clrMapOvr>
+  <mc:AlternateContent xmlns:mc="http://schemas.openxmlformats.org/markup-compatibility/2006">
+    <mc:Choice xmlns:p14="http://schemas.microsoft.com/office/powerpoint/2010/main" Requires="p14">
+      <p:transition spd="slow" p14:dur="1200"/>
+    </mc:Choice>
+    <mc:Fallback>
+      <p:transition spd="slow"/>
+    </mc:Fallback>
+  </mc:AlternateContent>
+</p:sld>
+</file>
+
+<file path=ppt/slides/slide9.xml><?xml version="1.0" encoding="utf-8"?>
+<p:sld xmlns:a="http://schemas.openxmlformats.org/drawingml/2006/main" xmlns:r="http://schemas.openxmlformats.org/officeDocument/2006/relationships" xmlns:p="http://schemas.openxmlformats.org/presentationml/2006/main">
+  <p:cSld>
+    <p:spTree>
+      <p:nvGrpSpPr>
+        <p:cNvPr id="1" name=""/>
+        <p:cNvGrpSpPr/>
+        <p:nvPr/>
+      </p:nvGrpSpPr>
+      <p:grpSpPr>
+        <a:xfrm>
+          <a:off x="0" y="0"/>
+          <a:ext cx="0" cy="0"/>
+          <a:chOff x="0" y="0"/>
+          <a:chExt cx="0" cy="0"/>
+        </a:xfrm>
+      </p:grpSpPr>
+      <p:sp>
+        <p:nvSpPr>
+          <p:cNvPr id="2" name="Title 1"/>
+          <p:cNvSpPr>
+            <a:spLocks noGrp="1"/>
+          </p:cNvSpPr>
+          <p:nvPr>
+            <p:ph type="title"/>
+          </p:nvPr>
+        </p:nvSpPr>
+        <p:spPr/>
+        <p:txBody>
+          <a:bodyPr/>
+          <a:lstStyle/>
+          <a:p>
+            <a:pPr algn="l"/>
+            <a:r>
+              <a:rPr lang="en-US">
+                <a:latin typeface="Ubuntu" panose="020B0504030602030204" charset="0"/>
+                <a:cs typeface="Ubuntu" panose="020B0504030602030204" charset="0"/>
+              </a:rPr>
+              <a:t>Handle Columns Distribution (cont)</a:t>
+            </a:r>
+            <a:endParaRPr lang="en-US">
+              <a:latin typeface="Ubuntu" panose="020B0504030602030204" charset="0"/>
+              <a:cs typeface="Ubuntu" panose="020B0504030602030204" charset="0"/>
+            </a:endParaRPr>
+          </a:p>
+        </p:txBody>
+      </p:sp>
+      <p:sp>
+        <p:nvSpPr>
+          <p:cNvPr id="3" name="Content Placeholder 2"/>
+          <p:cNvSpPr>
+            <a:spLocks noGrp="1"/>
+          </p:cNvSpPr>
+          <p:nvPr>
+            <p:ph idx="1"/>
+          </p:nvPr>
+        </p:nvSpPr>
+        <p:spPr/>
+        <p:txBody>
+          <a:bodyPr/>
+          <a:lstStyle/>
+          <a:p>
+            <a:pPr algn="l">
+              <a:buFont typeface="Arial" panose="02080604020202020204" pitchFamily="34" charset="0"/>
+              <a:buChar char="•"/>
+            </a:pPr>
+            <a:endParaRPr lang="en-US" altLang="ar-EG" sz="2400" dirty="0">
+              <a:latin typeface="Ubuntu" panose="020B0504030602030204" charset="0"/>
+              <a:cs typeface="Ubuntu" panose="020B0504030602030204" charset="0"/>
+            </a:endParaRPr>
+          </a:p>
+        </p:txBody>
+      </p:sp>
+      <p:pic>
+        <p:nvPicPr>
+          <p:cNvPr id="6" name="Picture 5" descr="A screenshot of a graph&#10;&#10;Description automatically generated"/>
+          <p:cNvPicPr>
+            <a:picLocks noChangeAspect="1"/>
+          </p:cNvPicPr>
+          <p:nvPr/>
+        </p:nvPicPr>
+        <p:blipFill rotWithShape="1">
+          <a:blip r:embed="rId1"/>
+          <a:srcRect l="75768" t="20290" r="-928" b="60116"/>
+          <a:stretch>
+            <a:fillRect/>
+          </a:stretch>
+        </p:blipFill>
+        <p:spPr>
+          <a:xfrm>
+            <a:off x="7124700" y="2490761"/>
+            <a:ext cx="4268913" cy="3324547"/>
+          </a:xfrm>
+          <a:prstGeom prst="rect">
+            <a:avLst/>
+          </a:prstGeom>
+        </p:spPr>
+      </p:pic>
+      <p:sp>
+        <p:nvSpPr>
+          <p:cNvPr id="7" name="Arrow: Right 4"/>
+          <p:cNvSpPr/>
+          <p:nvPr/>
+        </p:nvSpPr>
+        <p:spPr>
+          <a:xfrm>
+            <a:off x="4743450" y="3537530"/>
+            <a:ext cx="2266950" cy="1229263"/>
+          </a:xfrm>
+          <a:prstGeom prst="rightArrow">
+            <a:avLst/>
+          </a:prstGeom>
+        </p:spPr>
+        <p:style>
+          <a:lnRef idx="2">
+            <a:schemeClr val="accent1">
+              <a:shade val="15000"/>
+            </a:schemeClr>
+          </a:lnRef>
+          <a:fillRef idx="1">
+            <a:schemeClr val="accent1"/>
+          </a:fillRef>
+          <a:effectRef idx="0">
+            <a:schemeClr val="accent1"/>
+          </a:effectRef>
+          <a:fontRef idx="minor">
+            <a:schemeClr val="lt1"/>
+          </a:fontRef>
+        </p:style>
+        <p:txBody>
+          <a:bodyPr lIns="91440" tIns="45720" rIns="91440" bIns="45720" rtlCol="0" anchor="ctr"/>
+          <a:lstStyle/>
+          <a:p>
+            <a:pPr algn="ctr"/>
+            <a:r>
+              <a:rPr lang="en-US" sz="2400" dirty="0">
+                <a:cs typeface="Calibri"/>
+              </a:rPr>
+              <a:t>Reciprocal</a:t>
+            </a:r>
+            <a:endParaRPr lang="en-US" sz="2400" dirty="0"/>
+          </a:p>
+        </p:txBody>
+      </p:sp>
+      <p:pic>
+        <p:nvPicPr>
+          <p:cNvPr id="9" name="Picture 8" descr="A screenshot of a graph&#10;&#10;Description automatically generated"/>
+          <p:cNvPicPr>
+            <a:picLocks noChangeAspect="1"/>
+          </p:cNvPicPr>
+          <p:nvPr/>
+        </p:nvPicPr>
+        <p:blipFill rotWithShape="1">
+          <a:blip r:embed="rId2"/>
+          <a:srcRect l="75060" t="19922" r="180" b="60156"/>
+          <a:stretch>
+            <a:fillRect/>
+          </a:stretch>
+        </p:blipFill>
+        <p:spPr>
+          <a:xfrm>
+            <a:off x="478015" y="2490761"/>
+            <a:ext cx="4051797" cy="3260053"/>
+          </a:xfrm>
+          <a:prstGeom prst="rect">
+            <a:avLst/>
+          </a:prstGeom>
+        </p:spPr>
+      </p:pic>
+    </p:spTree>
+  </p:cSld>
+  <p:clrMapOvr>
+    <a:masterClrMapping/>
+  </p:clrMapOvr>
+  <mc:AlternateContent xmlns:mc="http://schemas.openxmlformats.org/markup-compatibility/2006">
+    <mc:Choice xmlns:p14="http://schemas.microsoft.com/office/powerpoint/2010/main" Requires="p14">
+      <p:transition spd="slow" p14:dur="1200"/>
+    </mc:Choice>
+    <mc:Fallback>
+      <p:transition spd="slow"/>
+    </mc:Fallback>
+  </mc:AlternateContent>
 </p:sld>
 </file>
 

</xml_diff>